<commit_message>
kernel paper from tutor
</commit_message>
<xml_diff>
--- a/presentation/2023_6_12_DCNN_Club.pptx
+++ b/presentation/2023_6_12_DCNN_Club.pptx
@@ -5,10 +5,18 @@
     <p:sldMasterId id="2147483648" r:id="rId1"/>
   </p:sldMasterIdLst>
   <p:notesMasterIdLst>
-    <p:notesMasterId r:id="rId3"/>
+    <p:notesMasterId r:id="rId11"/>
   </p:notesMasterIdLst>
   <p:sldIdLst>
-    <p:sldId id="256" r:id="rId2"/>
+    <p:sldId id="262" r:id="rId2"/>
+    <p:sldId id="263" r:id="rId3"/>
+    <p:sldId id="264" r:id="rId4"/>
+    <p:sldId id="256" r:id="rId5"/>
+    <p:sldId id="257" r:id="rId6"/>
+    <p:sldId id="258" r:id="rId7"/>
+    <p:sldId id="259" r:id="rId8"/>
+    <p:sldId id="260" r:id="rId9"/>
+    <p:sldId id="261" r:id="rId10"/>
   </p:sldIdLst>
   <p:sldSz cx="12192000" cy="6858000"/>
   <p:notesSz cx="6858000" cy="9144000"/>
@@ -107,6 +115,11 @@
       </a:defRPr>
     </a:lvl9pPr>
   </p:defaultTextStyle>
+  <p:extLst>
+    <p:ext uri="{EFAFB233-063F-42B5-8137-9DF3F51BA10A}">
+      <p15:sldGuideLst xmlns:p15="http://schemas.microsoft.com/office/powerpoint/2012/main"/>
+    </p:ext>
+  </p:extLst>
 </p:presentation>
 </file>
 
@@ -192,7 +205,7 @@
           <a:p>
             <a:fld id="{CB659266-5B8D-4AAD-B0CD-CF58AC60934B}" type="datetimeFigureOut">
               <a:rPr lang="zh-CN" altLang="en-US" smtClean="0"/>
-              <a:t>2023/6/10</a:t>
+              <a:t>2023/6/12</a:t>
             </a:fld>
             <a:endParaRPr lang="zh-CN" altLang="en-US"/>
           </a:p>
@@ -504,6 +517,354 @@
           <a:lstStyle/>
           <a:p>
             <a:r>
+              <a:rPr lang="zh-CN" altLang="en-US" sz="1200" b="0" i="0" kern="1200" dirty="0">
+                <a:solidFill>
+                  <a:schemeClr val="tx1"/>
+                </a:solidFill>
+                <a:effectLst/>
+                <a:latin typeface="+mn-lt"/>
+                <a:ea typeface="+mn-ea"/>
+                <a:cs typeface="+mn-cs"/>
+              </a:rPr>
+              <a:t>现在还有个问题是，</a:t>
+            </a:r>
+            <a:r>
+              <a:rPr lang="zh-CN" altLang="en-US" sz="1200" b="1" i="0" kern="1200" dirty="0">
+                <a:solidFill>
+                  <a:schemeClr val="tx1"/>
+                </a:solidFill>
+                <a:effectLst/>
+                <a:latin typeface="+mn-lt"/>
+                <a:ea typeface="+mn-ea"/>
+                <a:cs typeface="+mn-cs"/>
+              </a:rPr>
+              <a:t>深度卷积本身没有改变通道的能力，来的是多少通道输出就是多少通道</a:t>
+            </a:r>
+            <a:r>
+              <a:rPr lang="zh-CN" altLang="en-US" sz="1200" b="0" i="0" kern="1200" dirty="0">
+                <a:solidFill>
+                  <a:schemeClr val="tx1"/>
+                </a:solidFill>
+                <a:effectLst/>
+                <a:latin typeface="+mn-lt"/>
+                <a:ea typeface="+mn-ea"/>
+                <a:cs typeface="+mn-cs"/>
+              </a:rPr>
+              <a:t>。如果来的通道很少的话，</a:t>
+            </a:r>
+            <a:r>
+              <a:rPr lang="en-US" altLang="zh-CN" sz="1200" b="0" i="0" kern="1200" dirty="0">
+                <a:solidFill>
+                  <a:schemeClr val="tx1"/>
+                </a:solidFill>
+                <a:effectLst/>
+                <a:latin typeface="+mn-lt"/>
+                <a:ea typeface="+mn-ea"/>
+                <a:cs typeface="+mn-cs"/>
+              </a:rPr>
+              <a:t>DW</a:t>
+            </a:r>
+            <a:r>
+              <a:rPr lang="zh-CN" altLang="en-US" sz="1200" b="0" i="0" kern="1200" dirty="0">
+                <a:solidFill>
+                  <a:schemeClr val="tx1"/>
+                </a:solidFill>
+                <a:effectLst/>
+                <a:latin typeface="+mn-lt"/>
+                <a:ea typeface="+mn-ea"/>
+                <a:cs typeface="+mn-cs"/>
+              </a:rPr>
+              <a:t>深度卷积只能在低维度上工作，这样效果并不会很好，所以</a:t>
+            </a:r>
+            <a:r>
+              <a:rPr lang="zh-CN" altLang="en-US" sz="1200" b="1" i="0" kern="1200" dirty="0">
+                <a:solidFill>
+                  <a:schemeClr val="tx1"/>
+                </a:solidFill>
+                <a:effectLst/>
+                <a:latin typeface="+mn-lt"/>
+                <a:ea typeface="+mn-ea"/>
+                <a:cs typeface="+mn-cs"/>
+              </a:rPr>
+              <a:t>我们要“扩张”通道</a:t>
+            </a:r>
+            <a:r>
+              <a:rPr lang="zh-CN" altLang="en-US" sz="1200" b="0" i="0" kern="1200" dirty="0">
+                <a:solidFill>
+                  <a:schemeClr val="tx1"/>
+                </a:solidFill>
+                <a:effectLst/>
+                <a:latin typeface="+mn-lt"/>
+                <a:ea typeface="+mn-ea"/>
+                <a:cs typeface="+mn-cs"/>
+              </a:rPr>
+              <a:t>。既然我们已经知道</a:t>
+            </a:r>
+            <a:r>
+              <a:rPr lang="en-US" altLang="zh-CN" sz="1200" b="1" i="0" kern="1200" dirty="0">
+                <a:solidFill>
+                  <a:schemeClr val="tx1"/>
+                </a:solidFill>
+                <a:effectLst/>
+                <a:latin typeface="+mn-lt"/>
+                <a:ea typeface="+mn-ea"/>
+                <a:cs typeface="+mn-cs"/>
+              </a:rPr>
+              <a:t>PW</a:t>
+            </a:r>
+            <a:r>
+              <a:rPr lang="zh-CN" altLang="en-US" sz="1200" b="1" i="0" kern="1200" dirty="0">
+                <a:solidFill>
+                  <a:schemeClr val="tx1"/>
+                </a:solidFill>
+                <a:effectLst/>
+                <a:latin typeface="+mn-lt"/>
+                <a:ea typeface="+mn-ea"/>
+                <a:cs typeface="+mn-cs"/>
+              </a:rPr>
+              <a:t>逐点卷积也就是</a:t>
+            </a:r>
+            <a:r>
+              <a:rPr lang="en-US" altLang="zh-CN" sz="1200" b="1" i="0" kern="1200" dirty="0">
+                <a:solidFill>
+                  <a:schemeClr val="tx1"/>
+                </a:solidFill>
+                <a:effectLst/>
+                <a:latin typeface="+mn-lt"/>
+                <a:ea typeface="+mn-ea"/>
+                <a:cs typeface="+mn-cs"/>
+              </a:rPr>
+              <a:t>1×1</a:t>
+            </a:r>
+            <a:r>
+              <a:rPr lang="zh-CN" altLang="en-US" sz="1200" b="1" i="0" kern="1200" dirty="0">
+                <a:solidFill>
+                  <a:schemeClr val="tx1"/>
+                </a:solidFill>
+                <a:effectLst/>
+                <a:latin typeface="+mn-lt"/>
+                <a:ea typeface="+mn-ea"/>
+                <a:cs typeface="+mn-cs"/>
+              </a:rPr>
+              <a:t>卷积可以用来升维和降维</a:t>
+            </a:r>
+            <a:r>
+              <a:rPr lang="zh-CN" altLang="en-US" sz="1200" b="0" i="0" kern="1200" dirty="0">
+                <a:solidFill>
+                  <a:schemeClr val="tx1"/>
+                </a:solidFill>
+                <a:effectLst/>
+                <a:latin typeface="+mn-lt"/>
+                <a:ea typeface="+mn-ea"/>
+                <a:cs typeface="+mn-cs"/>
+              </a:rPr>
+              <a:t>，那就可以</a:t>
+            </a:r>
+            <a:r>
+              <a:rPr lang="zh-CN" altLang="en-US" sz="1200" b="1" i="0" kern="1200" dirty="0">
+                <a:solidFill>
+                  <a:schemeClr val="tx1"/>
+                </a:solidFill>
+                <a:effectLst/>
+                <a:latin typeface="+mn-lt"/>
+                <a:ea typeface="+mn-ea"/>
+                <a:cs typeface="+mn-cs"/>
+              </a:rPr>
+              <a:t>在</a:t>
+            </a:r>
+            <a:r>
+              <a:rPr lang="en-US" altLang="zh-CN" sz="1200" b="1" i="0" kern="1200" dirty="0">
+                <a:solidFill>
+                  <a:schemeClr val="tx1"/>
+                </a:solidFill>
+                <a:effectLst/>
+                <a:latin typeface="+mn-lt"/>
+                <a:ea typeface="+mn-ea"/>
+                <a:cs typeface="+mn-cs"/>
+              </a:rPr>
+              <a:t>DW</a:t>
+            </a:r>
+            <a:r>
+              <a:rPr lang="zh-CN" altLang="en-US" sz="1200" b="1" i="0" kern="1200" dirty="0">
+                <a:solidFill>
+                  <a:schemeClr val="tx1"/>
+                </a:solidFill>
+                <a:effectLst/>
+                <a:latin typeface="+mn-lt"/>
+                <a:ea typeface="+mn-ea"/>
+                <a:cs typeface="+mn-cs"/>
+              </a:rPr>
+              <a:t>深度卷积之前使用</a:t>
+            </a:r>
+            <a:r>
+              <a:rPr lang="en-US" altLang="zh-CN" sz="1200" b="1" i="0" kern="1200" dirty="0">
+                <a:solidFill>
+                  <a:schemeClr val="tx1"/>
+                </a:solidFill>
+                <a:effectLst/>
+                <a:latin typeface="+mn-lt"/>
+                <a:ea typeface="+mn-ea"/>
+                <a:cs typeface="+mn-cs"/>
+              </a:rPr>
+              <a:t>PW</a:t>
+            </a:r>
+            <a:r>
+              <a:rPr lang="zh-CN" altLang="en-US" sz="1200" b="1" i="0" kern="1200" dirty="0">
+                <a:solidFill>
+                  <a:schemeClr val="tx1"/>
+                </a:solidFill>
+                <a:effectLst/>
+                <a:latin typeface="+mn-lt"/>
+                <a:ea typeface="+mn-ea"/>
+                <a:cs typeface="+mn-cs"/>
+              </a:rPr>
+              <a:t>卷积进行升维（升维倍数为</a:t>
+            </a:r>
+            <a:r>
+              <a:rPr lang="en-US" altLang="zh-CN" sz="1200" b="1" i="0" kern="1200" dirty="0">
+                <a:solidFill>
+                  <a:schemeClr val="tx1"/>
+                </a:solidFill>
+                <a:effectLst/>
+                <a:latin typeface="+mn-lt"/>
+                <a:ea typeface="+mn-ea"/>
+                <a:cs typeface="+mn-cs"/>
+              </a:rPr>
+              <a:t>t</a:t>
+            </a:r>
+            <a:r>
+              <a:rPr lang="zh-CN" altLang="en-US" sz="1200" b="1" i="0" kern="1200" dirty="0">
+                <a:solidFill>
+                  <a:schemeClr val="tx1"/>
+                </a:solidFill>
+                <a:effectLst/>
+                <a:latin typeface="+mn-lt"/>
+                <a:ea typeface="+mn-ea"/>
+                <a:cs typeface="+mn-cs"/>
+              </a:rPr>
+              <a:t>，</a:t>
+            </a:r>
+            <a:r>
+              <a:rPr lang="en-US" altLang="zh-CN" sz="1200" b="1" i="0" kern="1200" dirty="0">
+                <a:solidFill>
+                  <a:schemeClr val="tx1"/>
+                </a:solidFill>
+                <a:effectLst/>
+                <a:latin typeface="+mn-lt"/>
+                <a:ea typeface="+mn-ea"/>
+                <a:cs typeface="+mn-cs"/>
+              </a:rPr>
+              <a:t>t=6</a:t>
+            </a:r>
+            <a:r>
+              <a:rPr lang="zh-CN" altLang="en-US" sz="1200" b="1" i="0" kern="1200" dirty="0">
+                <a:solidFill>
+                  <a:schemeClr val="tx1"/>
+                </a:solidFill>
+                <a:effectLst/>
+                <a:latin typeface="+mn-lt"/>
+                <a:ea typeface="+mn-ea"/>
+                <a:cs typeface="+mn-cs"/>
+              </a:rPr>
+              <a:t>），再在一个更高维的空间中进行卷积操作来提取特征</a:t>
+            </a:r>
+            <a:r>
+              <a:rPr lang="zh-CN" altLang="en-US" sz="1200" b="0" i="0" kern="1200" dirty="0">
+                <a:solidFill>
+                  <a:schemeClr val="tx1"/>
+                </a:solidFill>
+                <a:effectLst/>
+                <a:latin typeface="+mn-lt"/>
+                <a:ea typeface="+mn-ea"/>
+                <a:cs typeface="+mn-cs"/>
+              </a:rPr>
+              <a:t>：</a:t>
+            </a:r>
+            <a:endParaRPr lang="zh-CN" altLang="en-US" dirty="0"/>
+          </a:p>
+        </p:txBody>
+      </p:sp>
+      <p:sp>
+        <p:nvSpPr>
+          <p:cNvPr id="4" name="灯片编号占位符 3"/>
+          <p:cNvSpPr>
+            <a:spLocks noGrp="1"/>
+          </p:cNvSpPr>
+          <p:nvPr>
+            <p:ph type="sldNum" sz="quarter" idx="5"/>
+          </p:nvPr>
+        </p:nvSpPr>
+        <p:spPr/>
+        <p:txBody>
+          <a:bodyPr/>
+          <a:lstStyle/>
+          <a:p>
+            <a:fld id="{4CAF4508-DBBC-454C-A546-D6A4F40A130D}" type="slidenum">
+              <a:rPr lang="zh-CN" altLang="en-US" smtClean="0"/>
+              <a:t>3</a:t>
+            </a:fld>
+            <a:endParaRPr lang="zh-CN" altLang="en-US"/>
+          </a:p>
+        </p:txBody>
+      </p:sp>
+    </p:spTree>
+    <p:extLst>
+      <p:ext uri="{BB962C8B-B14F-4D97-AF65-F5344CB8AC3E}">
+        <p14:creationId xmlns:p14="http://schemas.microsoft.com/office/powerpoint/2010/main" val="2810040335"/>
+      </p:ext>
+    </p:extLst>
+  </p:cSld>
+  <p:clrMapOvr>
+    <a:masterClrMapping/>
+  </p:clrMapOvr>
+</p:notes>
+</file>
+
+<file path=ppt/notesSlides/notesSlide2.xml><?xml version="1.0" encoding="utf-8"?>
+<p:notes xmlns:a="http://schemas.openxmlformats.org/drawingml/2006/main" xmlns:r="http://schemas.openxmlformats.org/officeDocument/2006/relationships" xmlns:p="http://schemas.openxmlformats.org/presentationml/2006/main">
+  <p:cSld>
+    <p:spTree>
+      <p:nvGrpSpPr>
+        <p:cNvPr id="1" name=""/>
+        <p:cNvGrpSpPr/>
+        <p:nvPr/>
+      </p:nvGrpSpPr>
+      <p:grpSpPr>
+        <a:xfrm>
+          <a:off x="0" y="0"/>
+          <a:ext cx="0" cy="0"/>
+          <a:chOff x="0" y="0"/>
+          <a:chExt cx="0" cy="0"/>
+        </a:xfrm>
+      </p:grpSpPr>
+      <p:sp>
+        <p:nvSpPr>
+          <p:cNvPr id="2" name="幻灯片图像占位符 1"/>
+          <p:cNvSpPr>
+            <a:spLocks noGrp="1" noRot="1" noChangeAspect="1"/>
+          </p:cNvSpPr>
+          <p:nvPr>
+            <p:ph type="sldImg"/>
+          </p:nvPr>
+        </p:nvSpPr>
+        <p:spPr/>
+      </p:sp>
+      <p:sp>
+        <p:nvSpPr>
+          <p:cNvPr id="3" name="备注占位符 2"/>
+          <p:cNvSpPr>
+            <a:spLocks noGrp="1"/>
+          </p:cNvSpPr>
+          <p:nvPr>
+            <p:ph type="body" idx="1"/>
+          </p:nvPr>
+        </p:nvSpPr>
+        <p:spPr/>
+        <p:txBody>
+          <a:bodyPr/>
+          <a:lstStyle/>
+          <a:p>
+            <a:r>
               <a:rPr lang="en-US" altLang="zh-CN" dirty="0"/>
               <a:t>K </a:t>
             </a:r>
@@ -531,7 +892,7 @@
           <a:p>
             <a:fld id="{4CAF4508-DBBC-454C-A546-D6A4F40A130D}" type="slidenum">
               <a:rPr lang="zh-CN" altLang="en-US" smtClean="0"/>
-              <a:t>1</a:t>
+              <a:t>4</a:t>
             </a:fld>
             <a:endParaRPr lang="zh-CN" altLang="en-US"/>
           </a:p>
@@ -541,6 +902,384 @@
     <p:extLst>
       <p:ext uri="{BB962C8B-B14F-4D97-AF65-F5344CB8AC3E}">
         <p14:creationId xmlns:p14="http://schemas.microsoft.com/office/powerpoint/2010/main" val="353312516"/>
+      </p:ext>
+    </p:extLst>
+  </p:cSld>
+  <p:clrMapOvr>
+    <a:masterClrMapping/>
+  </p:clrMapOvr>
+</p:notes>
+</file>
+
+<file path=ppt/notesSlides/notesSlide3.xml><?xml version="1.0" encoding="utf-8"?>
+<p:notes xmlns:a="http://schemas.openxmlformats.org/drawingml/2006/main" xmlns:r="http://schemas.openxmlformats.org/officeDocument/2006/relationships" xmlns:p="http://schemas.openxmlformats.org/presentationml/2006/main">
+  <p:cSld>
+    <p:spTree>
+      <p:nvGrpSpPr>
+        <p:cNvPr id="1" name=""/>
+        <p:cNvGrpSpPr/>
+        <p:nvPr/>
+      </p:nvGrpSpPr>
+      <p:grpSpPr>
+        <a:xfrm>
+          <a:off x="0" y="0"/>
+          <a:ext cx="0" cy="0"/>
+          <a:chOff x="0" y="0"/>
+          <a:chExt cx="0" cy="0"/>
+        </a:xfrm>
+      </p:grpSpPr>
+      <p:sp>
+        <p:nvSpPr>
+          <p:cNvPr id="2" name="幻灯片图像占位符 1"/>
+          <p:cNvSpPr>
+            <a:spLocks noGrp="1" noRot="1" noChangeAspect="1"/>
+          </p:cNvSpPr>
+          <p:nvPr>
+            <p:ph type="sldImg"/>
+          </p:nvPr>
+        </p:nvSpPr>
+        <p:spPr/>
+      </p:sp>
+      <p:sp>
+        <p:nvSpPr>
+          <p:cNvPr id="3" name="备注占位符 2"/>
+          <p:cNvSpPr>
+            <a:spLocks noGrp="1"/>
+          </p:cNvSpPr>
+          <p:nvPr>
+            <p:ph type="body" idx="1"/>
+          </p:nvPr>
+        </p:nvSpPr>
+        <p:spPr/>
+        <p:txBody>
+          <a:bodyPr/>
+          <a:lstStyle/>
+          <a:p>
+            <a:r>
+              <a:rPr lang="en-US" altLang="zh-CN" sz="1200" b="0" i="0" kern="1200" dirty="0" err="1">
+                <a:solidFill>
+                  <a:schemeClr val="tx1"/>
+                </a:solidFill>
+                <a:effectLst/>
+                <a:latin typeface="+mn-lt"/>
+                <a:ea typeface="+mn-ea"/>
+                <a:cs typeface="+mn-cs"/>
+              </a:rPr>
+              <a:t>MobileNet</a:t>
+            </a:r>
+            <a:r>
+              <a:rPr lang="en-US" altLang="zh-CN" sz="1200" b="0" i="0" kern="1200" dirty="0">
+                <a:solidFill>
+                  <a:schemeClr val="tx1"/>
+                </a:solidFill>
+                <a:effectLst/>
+                <a:latin typeface="+mn-lt"/>
+                <a:ea typeface="+mn-ea"/>
+                <a:cs typeface="+mn-cs"/>
+              </a:rPr>
+              <a:t> V2</a:t>
+            </a:r>
+            <a:r>
+              <a:rPr lang="zh-CN" altLang="en-US" sz="1200" b="0" i="0" kern="1200" dirty="0">
+                <a:solidFill>
+                  <a:schemeClr val="tx1"/>
+                </a:solidFill>
+                <a:effectLst/>
+                <a:latin typeface="+mn-lt"/>
+                <a:ea typeface="+mn-ea"/>
+                <a:cs typeface="+mn-cs"/>
+              </a:rPr>
+              <a:t>是一种轻量级的卷积神经网络架构，用于图像分类和目标检测任务。其中的</a:t>
+            </a:r>
+            <a:r>
+              <a:rPr lang="en-US" altLang="zh-CN" sz="1200" b="0" i="0" kern="1200" dirty="0">
+                <a:solidFill>
+                  <a:schemeClr val="tx1"/>
+                </a:solidFill>
+                <a:effectLst/>
+                <a:latin typeface="+mn-lt"/>
+                <a:ea typeface="+mn-ea"/>
+                <a:cs typeface="+mn-cs"/>
+              </a:rPr>
+              <a:t>"width multipliers"</a:t>
+            </a:r>
+            <a:r>
+              <a:rPr lang="zh-CN" altLang="en-US" sz="1200" b="0" i="0" kern="1200" dirty="0">
+                <a:solidFill>
+                  <a:schemeClr val="tx1"/>
+                </a:solidFill>
+                <a:effectLst/>
+                <a:latin typeface="+mn-lt"/>
+                <a:ea typeface="+mn-ea"/>
+                <a:cs typeface="+mn-cs"/>
+              </a:rPr>
+              <a:t>是指网络的宽度乘数，它是</a:t>
+            </a:r>
+            <a:r>
+              <a:rPr lang="en-US" altLang="zh-CN" sz="1200" b="0" i="0" kern="1200" dirty="0" err="1">
+                <a:solidFill>
+                  <a:schemeClr val="tx1"/>
+                </a:solidFill>
+                <a:effectLst/>
+                <a:latin typeface="+mn-lt"/>
+                <a:ea typeface="+mn-ea"/>
+                <a:cs typeface="+mn-cs"/>
+              </a:rPr>
+              <a:t>MobileNet</a:t>
+            </a:r>
+            <a:r>
+              <a:rPr lang="en-US" altLang="zh-CN" sz="1200" b="0" i="0" kern="1200" dirty="0">
+                <a:solidFill>
+                  <a:schemeClr val="tx1"/>
+                </a:solidFill>
+                <a:effectLst/>
+                <a:latin typeface="+mn-lt"/>
+                <a:ea typeface="+mn-ea"/>
+                <a:cs typeface="+mn-cs"/>
+              </a:rPr>
+              <a:t> V2</a:t>
+            </a:r>
+            <a:r>
+              <a:rPr lang="zh-CN" altLang="en-US" sz="1200" b="0" i="0" kern="1200" dirty="0">
+                <a:solidFill>
+                  <a:schemeClr val="tx1"/>
+                </a:solidFill>
+                <a:effectLst/>
+                <a:latin typeface="+mn-lt"/>
+                <a:ea typeface="+mn-ea"/>
+                <a:cs typeface="+mn-cs"/>
+              </a:rPr>
+              <a:t>中的一个超参数。</a:t>
+            </a:r>
+          </a:p>
+          <a:p>
+            <a:r>
+              <a:rPr lang="zh-CN" altLang="en-US" sz="1200" b="0" i="0" kern="1200" dirty="0">
+                <a:solidFill>
+                  <a:schemeClr val="tx1"/>
+                </a:solidFill>
+                <a:effectLst/>
+                <a:latin typeface="+mn-lt"/>
+                <a:ea typeface="+mn-ea"/>
+                <a:cs typeface="+mn-cs"/>
+              </a:rPr>
+              <a:t>在</a:t>
+            </a:r>
+            <a:r>
+              <a:rPr lang="en-US" altLang="zh-CN" sz="1200" b="0" i="0" kern="1200" dirty="0" err="1">
+                <a:solidFill>
+                  <a:schemeClr val="tx1"/>
+                </a:solidFill>
+                <a:effectLst/>
+                <a:latin typeface="+mn-lt"/>
+                <a:ea typeface="+mn-ea"/>
+                <a:cs typeface="+mn-cs"/>
+              </a:rPr>
+              <a:t>MobileNet</a:t>
+            </a:r>
+            <a:r>
+              <a:rPr lang="en-US" altLang="zh-CN" sz="1200" b="0" i="0" kern="1200" dirty="0">
+                <a:solidFill>
+                  <a:schemeClr val="tx1"/>
+                </a:solidFill>
+                <a:effectLst/>
+                <a:latin typeface="+mn-lt"/>
+                <a:ea typeface="+mn-ea"/>
+                <a:cs typeface="+mn-cs"/>
+              </a:rPr>
+              <a:t> V2</a:t>
+            </a:r>
+            <a:r>
+              <a:rPr lang="zh-CN" altLang="en-US" sz="1200" b="0" i="0" kern="1200" dirty="0">
+                <a:solidFill>
+                  <a:schemeClr val="tx1"/>
+                </a:solidFill>
+                <a:effectLst/>
+                <a:latin typeface="+mn-lt"/>
+                <a:ea typeface="+mn-ea"/>
+                <a:cs typeface="+mn-cs"/>
+              </a:rPr>
+              <a:t>中，网络的宽度乘数用于控制网络层的通道数（即特征图的数量）。通过调整宽度乘数，可以控制网络的模型大小和计算复杂度。</a:t>
+            </a:r>
+          </a:p>
+          <a:p>
+            <a:r>
+              <a:rPr lang="zh-CN" altLang="en-US" sz="1200" b="0" i="0" kern="1200" dirty="0">
+                <a:solidFill>
+                  <a:schemeClr val="tx1"/>
+                </a:solidFill>
+                <a:effectLst/>
+                <a:latin typeface="+mn-lt"/>
+                <a:ea typeface="+mn-ea"/>
+                <a:cs typeface="+mn-cs"/>
+              </a:rPr>
+              <a:t>宽度乘数的取值范围通常在</a:t>
+            </a:r>
+            <a:r>
+              <a:rPr lang="en-US" altLang="zh-CN" sz="1200" b="0" i="0" kern="1200" dirty="0">
+                <a:solidFill>
+                  <a:schemeClr val="tx1"/>
+                </a:solidFill>
+                <a:effectLst/>
+                <a:latin typeface="+mn-lt"/>
+                <a:ea typeface="+mn-ea"/>
+                <a:cs typeface="+mn-cs"/>
+              </a:rPr>
+              <a:t>0</a:t>
+            </a:r>
+            <a:r>
+              <a:rPr lang="zh-CN" altLang="en-US" sz="1200" b="0" i="0" kern="1200" dirty="0">
+                <a:solidFill>
+                  <a:schemeClr val="tx1"/>
+                </a:solidFill>
+                <a:effectLst/>
+                <a:latin typeface="+mn-lt"/>
+                <a:ea typeface="+mn-ea"/>
+                <a:cs typeface="+mn-cs"/>
+              </a:rPr>
+              <a:t>到</a:t>
+            </a:r>
+            <a:r>
+              <a:rPr lang="en-US" altLang="zh-CN" sz="1200" b="0" i="0" kern="1200" dirty="0">
+                <a:solidFill>
+                  <a:schemeClr val="tx1"/>
+                </a:solidFill>
+                <a:effectLst/>
+                <a:latin typeface="+mn-lt"/>
+                <a:ea typeface="+mn-ea"/>
+                <a:cs typeface="+mn-cs"/>
+              </a:rPr>
+              <a:t>1</a:t>
+            </a:r>
+            <a:r>
+              <a:rPr lang="zh-CN" altLang="en-US" sz="1200" b="0" i="0" kern="1200" dirty="0">
+                <a:solidFill>
+                  <a:schemeClr val="tx1"/>
+                </a:solidFill>
+                <a:effectLst/>
+                <a:latin typeface="+mn-lt"/>
+                <a:ea typeface="+mn-ea"/>
+                <a:cs typeface="+mn-cs"/>
+              </a:rPr>
+              <a:t>之间，表示对原始</a:t>
+            </a:r>
+            <a:r>
+              <a:rPr lang="en-US" altLang="zh-CN" sz="1200" b="0" i="0" kern="1200" dirty="0" err="1">
+                <a:solidFill>
+                  <a:schemeClr val="tx1"/>
+                </a:solidFill>
+                <a:effectLst/>
+                <a:latin typeface="+mn-lt"/>
+                <a:ea typeface="+mn-ea"/>
+                <a:cs typeface="+mn-cs"/>
+              </a:rPr>
+              <a:t>MobileNet</a:t>
+            </a:r>
+            <a:r>
+              <a:rPr lang="en-US" altLang="zh-CN" sz="1200" b="0" i="0" kern="1200" dirty="0">
+                <a:solidFill>
+                  <a:schemeClr val="tx1"/>
+                </a:solidFill>
+                <a:effectLst/>
+                <a:latin typeface="+mn-lt"/>
+                <a:ea typeface="+mn-ea"/>
+                <a:cs typeface="+mn-cs"/>
+              </a:rPr>
+              <a:t> V2</a:t>
+            </a:r>
+            <a:r>
+              <a:rPr lang="zh-CN" altLang="en-US" sz="1200" b="0" i="0" kern="1200" dirty="0">
+                <a:solidFill>
+                  <a:schemeClr val="tx1"/>
+                </a:solidFill>
+                <a:effectLst/>
+                <a:latin typeface="+mn-lt"/>
+                <a:ea typeface="+mn-ea"/>
+                <a:cs typeface="+mn-cs"/>
+              </a:rPr>
+              <a:t>网络中通道数的缩放比例。例如，宽度乘数为</a:t>
+            </a:r>
+            <a:r>
+              <a:rPr lang="en-US" altLang="zh-CN" sz="1200" b="0" i="0" kern="1200" dirty="0">
+                <a:solidFill>
+                  <a:schemeClr val="tx1"/>
+                </a:solidFill>
+                <a:effectLst/>
+                <a:latin typeface="+mn-lt"/>
+                <a:ea typeface="+mn-ea"/>
+                <a:cs typeface="+mn-cs"/>
+              </a:rPr>
+              <a:t>0.5</a:t>
+            </a:r>
+            <a:r>
+              <a:rPr lang="zh-CN" altLang="en-US" sz="1200" b="0" i="0" kern="1200" dirty="0">
+                <a:solidFill>
+                  <a:schemeClr val="tx1"/>
+                </a:solidFill>
+                <a:effectLst/>
+                <a:latin typeface="+mn-lt"/>
+                <a:ea typeface="+mn-ea"/>
+                <a:cs typeface="+mn-cs"/>
+              </a:rPr>
+              <a:t>表示将原始网络中的通道数减半，而宽度乘数为</a:t>
+            </a:r>
+            <a:r>
+              <a:rPr lang="en-US" altLang="zh-CN" sz="1200" b="0" i="0" kern="1200" dirty="0">
+                <a:solidFill>
+                  <a:schemeClr val="tx1"/>
+                </a:solidFill>
+                <a:effectLst/>
+                <a:latin typeface="+mn-lt"/>
+                <a:ea typeface="+mn-ea"/>
+                <a:cs typeface="+mn-cs"/>
+              </a:rPr>
+              <a:t>1</a:t>
+            </a:r>
+            <a:r>
+              <a:rPr lang="zh-CN" altLang="en-US" sz="1200" b="0" i="0" kern="1200" dirty="0">
+                <a:solidFill>
+                  <a:schemeClr val="tx1"/>
+                </a:solidFill>
+                <a:effectLst/>
+                <a:latin typeface="+mn-lt"/>
+                <a:ea typeface="+mn-ea"/>
+                <a:cs typeface="+mn-cs"/>
+              </a:rPr>
+              <a:t>表示保持原始网络中的通道数不变。</a:t>
+            </a:r>
+          </a:p>
+          <a:p>
+            <a:endParaRPr lang="zh-CN" altLang="en-US" dirty="0"/>
+          </a:p>
+        </p:txBody>
+      </p:sp>
+      <p:sp>
+        <p:nvSpPr>
+          <p:cNvPr id="4" name="灯片编号占位符 3"/>
+          <p:cNvSpPr>
+            <a:spLocks noGrp="1"/>
+          </p:cNvSpPr>
+          <p:nvPr>
+            <p:ph type="sldNum" sz="quarter" idx="5"/>
+          </p:nvPr>
+        </p:nvSpPr>
+        <p:spPr/>
+        <p:txBody>
+          <a:bodyPr/>
+          <a:lstStyle/>
+          <a:p>
+            <a:fld id="{4CAF4508-DBBC-454C-A546-D6A4F40A130D}" type="slidenum">
+              <a:rPr lang="zh-CN" altLang="en-US" smtClean="0"/>
+              <a:t>6</a:t>
+            </a:fld>
+            <a:endParaRPr lang="zh-CN" altLang="en-US"/>
+          </a:p>
+        </p:txBody>
+      </p:sp>
+    </p:spTree>
+    <p:extLst>
+      <p:ext uri="{BB962C8B-B14F-4D97-AF65-F5344CB8AC3E}">
+        <p14:creationId xmlns:p14="http://schemas.microsoft.com/office/powerpoint/2010/main" val="1168286908"/>
       </p:ext>
     </p:extLst>
   </p:cSld>
@@ -697,7 +1436,7 @@
           <a:p>
             <a:fld id="{FF33EF03-48D1-4E92-8229-635D1C0BA239}" type="datetimeFigureOut">
               <a:rPr lang="zh-CN" altLang="en-US" smtClean="0"/>
-              <a:t>2023/6/10</a:t>
+              <a:t>2023/6/12</a:t>
             </a:fld>
             <a:endParaRPr lang="zh-CN" altLang="en-US"/>
           </a:p>
@@ -895,7 +1634,7 @@
           <a:p>
             <a:fld id="{FF33EF03-48D1-4E92-8229-635D1C0BA239}" type="datetimeFigureOut">
               <a:rPr lang="zh-CN" altLang="en-US" smtClean="0"/>
-              <a:t>2023/6/10</a:t>
+              <a:t>2023/6/12</a:t>
             </a:fld>
             <a:endParaRPr lang="zh-CN" altLang="en-US"/>
           </a:p>
@@ -1103,7 +1842,7 @@
           <a:p>
             <a:fld id="{FF33EF03-48D1-4E92-8229-635D1C0BA239}" type="datetimeFigureOut">
               <a:rPr lang="zh-CN" altLang="en-US" smtClean="0"/>
-              <a:t>2023/6/10</a:t>
+              <a:t>2023/6/12</a:t>
             </a:fld>
             <a:endParaRPr lang="zh-CN" altLang="en-US"/>
           </a:p>
@@ -1301,7 +2040,7 @@
           <a:p>
             <a:fld id="{FF33EF03-48D1-4E92-8229-635D1C0BA239}" type="datetimeFigureOut">
               <a:rPr lang="zh-CN" altLang="en-US" smtClean="0"/>
-              <a:t>2023/6/10</a:t>
+              <a:t>2023/6/12</a:t>
             </a:fld>
             <a:endParaRPr lang="zh-CN" altLang="en-US"/>
           </a:p>
@@ -1576,7 +2315,7 @@
           <a:p>
             <a:fld id="{FF33EF03-48D1-4E92-8229-635D1C0BA239}" type="datetimeFigureOut">
               <a:rPr lang="zh-CN" altLang="en-US" smtClean="0"/>
-              <a:t>2023/6/10</a:t>
+              <a:t>2023/6/12</a:t>
             </a:fld>
             <a:endParaRPr lang="zh-CN" altLang="en-US"/>
           </a:p>
@@ -1841,7 +2580,7 @@
           <a:p>
             <a:fld id="{FF33EF03-48D1-4E92-8229-635D1C0BA239}" type="datetimeFigureOut">
               <a:rPr lang="zh-CN" altLang="en-US" smtClean="0"/>
-              <a:t>2023/6/10</a:t>
+              <a:t>2023/6/12</a:t>
             </a:fld>
             <a:endParaRPr lang="zh-CN" altLang="en-US"/>
           </a:p>
@@ -2253,7 +2992,7 @@
           <a:p>
             <a:fld id="{FF33EF03-48D1-4E92-8229-635D1C0BA239}" type="datetimeFigureOut">
               <a:rPr lang="zh-CN" altLang="en-US" smtClean="0"/>
-              <a:t>2023/6/10</a:t>
+              <a:t>2023/6/12</a:t>
             </a:fld>
             <a:endParaRPr lang="zh-CN" altLang="en-US"/>
           </a:p>
@@ -2394,7 +3133,7 @@
           <a:p>
             <a:fld id="{FF33EF03-48D1-4E92-8229-635D1C0BA239}" type="datetimeFigureOut">
               <a:rPr lang="zh-CN" altLang="en-US" smtClean="0"/>
-              <a:t>2023/6/10</a:t>
+              <a:t>2023/6/12</a:t>
             </a:fld>
             <a:endParaRPr lang="zh-CN" altLang="en-US"/>
           </a:p>
@@ -2507,7 +3246,7 @@
           <a:p>
             <a:fld id="{FF33EF03-48D1-4E92-8229-635D1C0BA239}" type="datetimeFigureOut">
               <a:rPr lang="zh-CN" altLang="en-US" smtClean="0"/>
-              <a:t>2023/6/10</a:t>
+              <a:t>2023/6/12</a:t>
             </a:fld>
             <a:endParaRPr lang="zh-CN" altLang="en-US"/>
           </a:p>
@@ -2818,7 +3557,7 @@
           <a:p>
             <a:fld id="{FF33EF03-48D1-4E92-8229-635D1C0BA239}" type="datetimeFigureOut">
               <a:rPr lang="zh-CN" altLang="en-US" smtClean="0"/>
-              <a:t>2023/6/10</a:t>
+              <a:t>2023/6/12</a:t>
             </a:fld>
             <a:endParaRPr lang="zh-CN" altLang="en-US"/>
           </a:p>
@@ -3106,7 +3845,7 @@
           <a:p>
             <a:fld id="{FF33EF03-48D1-4E92-8229-635D1C0BA239}" type="datetimeFigureOut">
               <a:rPr lang="zh-CN" altLang="en-US" smtClean="0"/>
-              <a:t>2023/6/10</a:t>
+              <a:t>2023/6/12</a:t>
             </a:fld>
             <a:endParaRPr lang="zh-CN" altLang="en-US"/>
           </a:p>
@@ -3347,7 +4086,7 @@
           <a:p>
             <a:fld id="{FF33EF03-48D1-4E92-8229-635D1C0BA239}" type="datetimeFigureOut">
               <a:rPr lang="zh-CN" altLang="en-US" smtClean="0"/>
-              <a:t>2023/6/10</a:t>
+              <a:t>2023/6/12</a:t>
             </a:fld>
             <a:endParaRPr lang="zh-CN" altLang="en-US"/>
           </a:p>
@@ -3766,6 +4505,938 @@
       </p:grpSpPr>
       <p:pic>
         <p:nvPicPr>
+          <p:cNvPr id="4" name="图片 3">
+            <a:extLst>
+              <a:ext uri="{FF2B5EF4-FFF2-40B4-BE49-F238E27FC236}">
+                <a16:creationId xmlns:a16="http://schemas.microsoft.com/office/drawing/2014/main" id="{84C3378E-2303-4BBA-8EBA-CBD10CFC97A6}"/>
+              </a:ext>
+            </a:extLst>
+          </p:cNvPr>
+          <p:cNvPicPr>
+            <a:picLocks noChangeAspect="1"/>
+          </p:cNvPicPr>
+          <p:nvPr/>
+        </p:nvPicPr>
+        <p:blipFill>
+          <a:blip r:embed="rId2"/>
+          <a:stretch>
+            <a:fillRect/>
+          </a:stretch>
+        </p:blipFill>
+        <p:spPr>
+          <a:xfrm>
+            <a:off x="769620" y="1600582"/>
+            <a:ext cx="11026140" cy="4089211"/>
+          </a:xfrm>
+          <a:prstGeom prst="rect">
+            <a:avLst/>
+          </a:prstGeom>
+        </p:spPr>
+      </p:pic>
+    </p:spTree>
+    <p:extLst>
+      <p:ext uri="{BB962C8B-B14F-4D97-AF65-F5344CB8AC3E}">
+        <p14:creationId xmlns:p14="http://schemas.microsoft.com/office/powerpoint/2010/main" val="3564140436"/>
+      </p:ext>
+    </p:extLst>
+  </p:cSld>
+  <p:clrMapOvr>
+    <a:masterClrMapping/>
+  </p:clrMapOvr>
+</p:sld>
+</file>
+
+<file path=ppt/slides/slide2.xml><?xml version="1.0" encoding="utf-8"?>
+<p:sld xmlns:a="http://schemas.openxmlformats.org/drawingml/2006/main" xmlns:r="http://schemas.openxmlformats.org/officeDocument/2006/relationships" xmlns:p="http://schemas.openxmlformats.org/presentationml/2006/main">
+  <p:cSld>
+    <p:spTree>
+      <p:nvGrpSpPr>
+        <p:cNvPr id="1" name=""/>
+        <p:cNvGrpSpPr/>
+        <p:nvPr/>
+      </p:nvGrpSpPr>
+      <p:grpSpPr>
+        <a:xfrm>
+          <a:off x="0" y="0"/>
+          <a:ext cx="0" cy="0"/>
+          <a:chOff x="0" y="0"/>
+          <a:chExt cx="0" cy="0"/>
+        </a:xfrm>
+      </p:grpSpPr>
+      <p:grpSp>
+        <p:nvGrpSpPr>
+          <p:cNvPr id="11" name="组合 10">
+            <a:extLst>
+              <a:ext uri="{FF2B5EF4-FFF2-40B4-BE49-F238E27FC236}">
+                <a16:creationId xmlns:a16="http://schemas.microsoft.com/office/drawing/2014/main" id="{871D7CD6-1511-4275-8786-BA276BE34343}"/>
+              </a:ext>
+            </a:extLst>
+          </p:cNvPr>
+          <p:cNvGrpSpPr/>
+          <p:nvPr/>
+        </p:nvGrpSpPr>
+        <p:grpSpPr>
+          <a:xfrm>
+            <a:off x="775289" y="4334651"/>
+            <a:ext cx="9341026" cy="2428099"/>
+            <a:chOff x="705384" y="3930547"/>
+            <a:chExt cx="10569578" cy="2822373"/>
+          </a:xfrm>
+        </p:grpSpPr>
+        <p:pic>
+          <p:nvPicPr>
+            <p:cNvPr id="2050" name="Picture 2" descr="0">
+              <a:extLst>
+                <a:ext uri="{FF2B5EF4-FFF2-40B4-BE49-F238E27FC236}">
+                  <a16:creationId xmlns:a16="http://schemas.microsoft.com/office/drawing/2014/main" id="{A3718272-59C4-416F-8B02-3B7C26607EC5}"/>
+                </a:ext>
+              </a:extLst>
+            </p:cNvPr>
+            <p:cNvPicPr>
+              <a:picLocks noChangeAspect="1" noChangeArrowheads="1"/>
+            </p:cNvPicPr>
+            <p:nvPr/>
+          </p:nvPicPr>
+          <p:blipFill>
+            <a:blip r:embed="rId2">
+              <a:extLst>
+                <a:ext uri="{28A0092B-C50C-407E-A947-70E740481C1C}">
+                  <a14:useLocalDpi xmlns:a14="http://schemas.microsoft.com/office/drawing/2010/main" val="0"/>
+                </a:ext>
+              </a:extLst>
+            </a:blip>
+            <a:srcRect/>
+            <a:stretch>
+              <a:fillRect/>
+            </a:stretch>
+          </p:blipFill>
+          <p:spPr bwMode="auto">
+            <a:xfrm>
+              <a:off x="6191517" y="3930547"/>
+              <a:ext cx="5083445" cy="2231288"/>
+            </a:xfrm>
+            <a:prstGeom prst="rect">
+              <a:avLst/>
+            </a:prstGeom>
+            <a:noFill/>
+            <a:extLst>
+              <a:ext uri="{909E8E84-426E-40DD-AFC4-6F175D3DCCD1}">
+                <a14:hiddenFill xmlns:a14="http://schemas.microsoft.com/office/drawing/2010/main">
+                  <a:solidFill>
+                    <a:srgbClr val="FFFFFF"/>
+                  </a:solidFill>
+                </a14:hiddenFill>
+              </a:ext>
+            </a:extLst>
+          </p:spPr>
+        </p:pic>
+        <p:pic>
+          <p:nvPicPr>
+            <p:cNvPr id="2052" name="Picture 4" descr="0">
+              <a:extLst>
+                <a:ext uri="{FF2B5EF4-FFF2-40B4-BE49-F238E27FC236}">
+                  <a16:creationId xmlns:a16="http://schemas.microsoft.com/office/drawing/2014/main" id="{08F93D60-4949-4884-862F-569C86FF16B3}"/>
+                </a:ext>
+              </a:extLst>
+            </p:cNvPr>
+            <p:cNvPicPr>
+              <a:picLocks noChangeAspect="1" noChangeArrowheads="1"/>
+            </p:cNvPicPr>
+            <p:nvPr/>
+          </p:nvPicPr>
+          <p:blipFill>
+            <a:blip r:embed="rId3">
+              <a:extLst>
+                <a:ext uri="{28A0092B-C50C-407E-A947-70E740481C1C}">
+                  <a14:useLocalDpi xmlns:a14="http://schemas.microsoft.com/office/drawing/2010/main" val="0"/>
+                </a:ext>
+              </a:extLst>
+            </a:blip>
+            <a:srcRect/>
+            <a:stretch>
+              <a:fillRect/>
+            </a:stretch>
+          </p:blipFill>
+          <p:spPr bwMode="auto">
+            <a:xfrm>
+              <a:off x="705384" y="4011151"/>
+              <a:ext cx="4908814" cy="1927732"/>
+            </a:xfrm>
+            <a:prstGeom prst="rect">
+              <a:avLst/>
+            </a:prstGeom>
+            <a:noFill/>
+            <a:extLst>
+              <a:ext uri="{909E8E84-426E-40DD-AFC4-6F175D3DCCD1}">
+                <a14:hiddenFill xmlns:a14="http://schemas.microsoft.com/office/drawing/2010/main">
+                  <a:solidFill>
+                    <a:srgbClr val="FFFFFF"/>
+                  </a:solidFill>
+                </a14:hiddenFill>
+              </a:ext>
+            </a:extLst>
+          </p:spPr>
+        </p:pic>
+        <p:sp>
+          <p:nvSpPr>
+            <p:cNvPr id="5" name="矩形 4">
+              <a:extLst>
+                <a:ext uri="{FF2B5EF4-FFF2-40B4-BE49-F238E27FC236}">
+                  <a16:creationId xmlns:a16="http://schemas.microsoft.com/office/drawing/2014/main" id="{D26CE91A-15AD-4933-B263-0016F0CB835B}"/>
+                </a:ext>
+              </a:extLst>
+            </p:cNvPr>
+            <p:cNvSpPr/>
+            <p:nvPr/>
+          </p:nvSpPr>
+          <p:spPr>
+            <a:xfrm>
+              <a:off x="5172074" y="6383588"/>
+              <a:ext cx="1800493" cy="369332"/>
+            </a:xfrm>
+            <a:prstGeom prst="rect">
+              <a:avLst/>
+            </a:prstGeom>
+          </p:spPr>
+          <p:txBody>
+            <a:bodyPr wrap="none">
+              <a:spAutoFit/>
+            </a:bodyPr>
+            <a:lstStyle/>
+            <a:p>
+              <a:r>
+                <a:rPr lang="zh-CN" altLang="en-US" dirty="0">
+                  <a:solidFill>
+                    <a:srgbClr val="4D4D4D"/>
+                  </a:solidFill>
+                  <a:latin typeface="-apple-system"/>
+                </a:rPr>
+                <a:t>深度可分离卷积</a:t>
+              </a:r>
+              <a:endParaRPr lang="zh-CN" altLang="en-US" dirty="0"/>
+            </a:p>
+          </p:txBody>
+        </p:sp>
+        <p:sp>
+          <p:nvSpPr>
+            <p:cNvPr id="6" name="矩形 5">
+              <a:extLst>
+                <a:ext uri="{FF2B5EF4-FFF2-40B4-BE49-F238E27FC236}">
+                  <a16:creationId xmlns:a16="http://schemas.microsoft.com/office/drawing/2014/main" id="{7E8C5C71-6BA3-497B-B7EF-8F024B4E2C51}"/>
+                </a:ext>
+              </a:extLst>
+            </p:cNvPr>
+            <p:cNvSpPr/>
+            <p:nvPr/>
+          </p:nvSpPr>
+          <p:spPr>
+            <a:xfrm>
+              <a:off x="1768057" y="5977169"/>
+              <a:ext cx="2974469" cy="369332"/>
+            </a:xfrm>
+            <a:prstGeom prst="rect">
+              <a:avLst/>
+            </a:prstGeom>
+          </p:spPr>
+          <p:txBody>
+            <a:bodyPr wrap="none">
+              <a:spAutoFit/>
+            </a:bodyPr>
+            <a:lstStyle/>
+            <a:p>
+              <a:r>
+                <a:rPr lang="pt-BR" altLang="zh-CN" dirty="0">
+                  <a:solidFill>
+                    <a:srgbClr val="4D4D4D"/>
+                  </a:solidFill>
+                  <a:latin typeface="-apple-system"/>
+                </a:rPr>
+                <a:t>N_depthwise = 3 × 3 × 3 = 27</a:t>
+              </a:r>
+              <a:endParaRPr lang="zh-CN" altLang="en-US" dirty="0"/>
+            </a:p>
+          </p:txBody>
+        </p:sp>
+        <p:sp>
+          <p:nvSpPr>
+            <p:cNvPr id="7" name="矩形 6">
+              <a:extLst>
+                <a:ext uri="{FF2B5EF4-FFF2-40B4-BE49-F238E27FC236}">
+                  <a16:creationId xmlns:a16="http://schemas.microsoft.com/office/drawing/2014/main" id="{8E262475-893E-4BA4-951B-F79C5AB7EA8A}"/>
+                </a:ext>
+              </a:extLst>
+            </p:cNvPr>
+            <p:cNvSpPr/>
+            <p:nvPr/>
+          </p:nvSpPr>
+          <p:spPr>
+            <a:xfrm>
+              <a:off x="7575615" y="6088046"/>
+              <a:ext cx="3289170" cy="369332"/>
+            </a:xfrm>
+            <a:prstGeom prst="rect">
+              <a:avLst/>
+            </a:prstGeom>
+          </p:spPr>
+          <p:txBody>
+            <a:bodyPr wrap="none">
+              <a:spAutoFit/>
+            </a:bodyPr>
+            <a:lstStyle/>
+            <a:p>
+              <a:r>
+                <a:rPr lang="en-US" altLang="zh-CN" dirty="0" err="1">
+                  <a:solidFill>
+                    <a:srgbClr val="4D4D4D"/>
+                  </a:solidFill>
+                  <a:latin typeface="-apple-system"/>
+                </a:rPr>
+                <a:t>N_pointwise</a:t>
+              </a:r>
+              <a:r>
+                <a:rPr lang="en-US" altLang="zh-CN" dirty="0">
+                  <a:solidFill>
+                    <a:srgbClr val="4D4D4D"/>
+                  </a:solidFill>
+                  <a:latin typeface="-apple-system"/>
+                </a:rPr>
+                <a:t> = 1 × 1 × 3 × 4 = 12</a:t>
+              </a:r>
+              <a:endParaRPr lang="zh-CN" altLang="en-US" dirty="0"/>
+            </a:p>
+          </p:txBody>
+        </p:sp>
+      </p:grpSp>
+      <p:grpSp>
+        <p:nvGrpSpPr>
+          <p:cNvPr id="10" name="组合 9">
+            <a:extLst>
+              <a:ext uri="{FF2B5EF4-FFF2-40B4-BE49-F238E27FC236}">
+                <a16:creationId xmlns:a16="http://schemas.microsoft.com/office/drawing/2014/main" id="{0ACE414D-3557-42FC-83A4-8FE861296AA5}"/>
+              </a:ext>
+            </a:extLst>
+          </p:cNvPr>
+          <p:cNvGrpSpPr/>
+          <p:nvPr/>
+        </p:nvGrpSpPr>
+        <p:grpSpPr>
+          <a:xfrm>
+            <a:off x="646921" y="1069046"/>
+            <a:ext cx="4798881" cy="2989324"/>
+            <a:chOff x="3188366" y="337318"/>
+            <a:chExt cx="5430040" cy="3474730"/>
+          </a:xfrm>
+        </p:grpSpPr>
+        <p:pic>
+          <p:nvPicPr>
+            <p:cNvPr id="2054" name="Picture 6" descr="0">
+              <a:extLst>
+                <a:ext uri="{FF2B5EF4-FFF2-40B4-BE49-F238E27FC236}">
+                  <a16:creationId xmlns:a16="http://schemas.microsoft.com/office/drawing/2014/main" id="{5F103915-90B1-4351-B8D3-C4164A62C9F1}"/>
+                </a:ext>
+              </a:extLst>
+            </p:cNvPr>
+            <p:cNvPicPr>
+              <a:picLocks noChangeAspect="1" noChangeArrowheads="1"/>
+            </p:cNvPicPr>
+            <p:nvPr/>
+          </p:nvPicPr>
+          <p:blipFill>
+            <a:blip r:embed="rId4">
+              <a:extLst>
+                <a:ext uri="{28A0092B-C50C-407E-A947-70E740481C1C}">
+                  <a14:useLocalDpi xmlns:a14="http://schemas.microsoft.com/office/drawing/2010/main" val="0"/>
+                </a:ext>
+              </a:extLst>
+            </a:blip>
+            <a:srcRect/>
+            <a:stretch>
+              <a:fillRect/>
+            </a:stretch>
+          </p:blipFill>
+          <p:spPr bwMode="auto">
+            <a:xfrm>
+              <a:off x="3188366" y="337318"/>
+              <a:ext cx="5430040" cy="2886830"/>
+            </a:xfrm>
+            <a:prstGeom prst="rect">
+              <a:avLst/>
+            </a:prstGeom>
+            <a:noFill/>
+            <a:extLst>
+              <a:ext uri="{909E8E84-426E-40DD-AFC4-6F175D3DCCD1}">
+                <a14:hiddenFill xmlns:a14="http://schemas.microsoft.com/office/drawing/2010/main">
+                  <a:solidFill>
+                    <a:srgbClr val="FFFFFF"/>
+                  </a:solidFill>
+                </a14:hiddenFill>
+              </a:ext>
+            </a:extLst>
+          </p:spPr>
+        </p:pic>
+        <p:sp>
+          <p:nvSpPr>
+            <p:cNvPr id="4" name="文本框 3">
+              <a:extLst>
+                <a:ext uri="{FF2B5EF4-FFF2-40B4-BE49-F238E27FC236}">
+                  <a16:creationId xmlns:a16="http://schemas.microsoft.com/office/drawing/2014/main" id="{3A277D38-9936-4B3B-AB90-D724150C203F}"/>
+                </a:ext>
+              </a:extLst>
+            </p:cNvPr>
+            <p:cNvSpPr txBox="1"/>
+            <p:nvPr/>
+          </p:nvSpPr>
+          <p:spPr>
+            <a:xfrm>
+              <a:off x="5331973" y="3442716"/>
+              <a:ext cx="2667000" cy="369332"/>
+            </a:xfrm>
+            <a:prstGeom prst="rect">
+              <a:avLst/>
+            </a:prstGeom>
+            <a:noFill/>
+          </p:spPr>
+          <p:txBody>
+            <a:bodyPr wrap="square" rtlCol="0">
+              <a:spAutoFit/>
+            </a:bodyPr>
+            <a:lstStyle/>
+            <a:p>
+              <a:r>
+                <a:rPr lang="zh-CN" altLang="en-US" dirty="0"/>
+                <a:t>常规卷积</a:t>
+              </a:r>
+            </a:p>
+          </p:txBody>
+        </p:sp>
+        <p:sp>
+          <p:nvSpPr>
+            <p:cNvPr id="8" name="矩形 7">
+              <a:extLst>
+                <a:ext uri="{FF2B5EF4-FFF2-40B4-BE49-F238E27FC236}">
+                  <a16:creationId xmlns:a16="http://schemas.microsoft.com/office/drawing/2014/main" id="{3AB65ED3-E8FB-44E9-95EB-3F1DE561525E}"/>
+                </a:ext>
+              </a:extLst>
+            </p:cNvPr>
+            <p:cNvSpPr/>
+            <p:nvPr/>
+          </p:nvSpPr>
+          <p:spPr>
+            <a:xfrm>
+              <a:off x="4614152" y="3079921"/>
+              <a:ext cx="2773195" cy="369332"/>
+            </a:xfrm>
+            <a:prstGeom prst="rect">
+              <a:avLst/>
+            </a:prstGeom>
+          </p:spPr>
+          <p:txBody>
+            <a:bodyPr wrap="none">
+              <a:spAutoFit/>
+            </a:bodyPr>
+            <a:lstStyle/>
+            <a:p>
+              <a:r>
+                <a:rPr lang="pt-BR" altLang="zh-CN" dirty="0">
+                  <a:solidFill>
+                    <a:srgbClr val="4D4D4D"/>
+                  </a:solidFill>
+                  <a:latin typeface="-apple-system"/>
+                </a:rPr>
+                <a:t>N_std = 4 × 3 × 3 × 3 = 108</a:t>
+              </a:r>
+              <a:endParaRPr lang="zh-CN" altLang="en-US" dirty="0"/>
+            </a:p>
+          </p:txBody>
+        </p:sp>
+      </p:grpSp>
+      <p:pic>
+        <p:nvPicPr>
+          <p:cNvPr id="9" name="图片 8">
+            <a:extLst>
+              <a:ext uri="{FF2B5EF4-FFF2-40B4-BE49-F238E27FC236}">
+                <a16:creationId xmlns:a16="http://schemas.microsoft.com/office/drawing/2014/main" id="{D53E6BE6-434F-4B5D-81F8-393D80324123}"/>
+              </a:ext>
+            </a:extLst>
+          </p:cNvPr>
+          <p:cNvPicPr>
+            <a:picLocks noChangeAspect="1"/>
+          </p:cNvPicPr>
+          <p:nvPr/>
+        </p:nvPicPr>
+        <p:blipFill>
+          <a:blip r:embed="rId5"/>
+          <a:stretch>
+            <a:fillRect/>
+          </a:stretch>
+        </p:blipFill>
+        <p:spPr>
+          <a:xfrm>
+            <a:off x="6746199" y="2714350"/>
+            <a:ext cx="4562483" cy="883876"/>
+          </a:xfrm>
+          <a:prstGeom prst="rect">
+            <a:avLst/>
+          </a:prstGeom>
+        </p:spPr>
+      </p:pic>
+      <p:grpSp>
+        <p:nvGrpSpPr>
+          <p:cNvPr id="16" name="组合 15">
+            <a:extLst>
+              <a:ext uri="{FF2B5EF4-FFF2-40B4-BE49-F238E27FC236}">
+                <a16:creationId xmlns:a16="http://schemas.microsoft.com/office/drawing/2014/main" id="{72405AD3-B35F-4D2D-9066-B00F699244FE}"/>
+              </a:ext>
+            </a:extLst>
+          </p:cNvPr>
+          <p:cNvGrpSpPr/>
+          <p:nvPr/>
+        </p:nvGrpSpPr>
+        <p:grpSpPr>
+          <a:xfrm>
+            <a:off x="6291555" y="1955107"/>
+            <a:ext cx="5092808" cy="631084"/>
+            <a:chOff x="6410592" y="1689523"/>
+            <a:chExt cx="5762625" cy="733559"/>
+          </a:xfrm>
+        </p:grpSpPr>
+        <p:pic>
+          <p:nvPicPr>
+            <p:cNvPr id="14" name="图片 13">
+              <a:extLst>
+                <a:ext uri="{FF2B5EF4-FFF2-40B4-BE49-F238E27FC236}">
+                  <a16:creationId xmlns:a16="http://schemas.microsoft.com/office/drawing/2014/main" id="{C0641658-9D0F-48DD-BBC5-4C55316C1A03}"/>
+                </a:ext>
+              </a:extLst>
+            </p:cNvPr>
+            <p:cNvPicPr>
+              <a:picLocks noChangeAspect="1"/>
+            </p:cNvPicPr>
+            <p:nvPr/>
+          </p:nvPicPr>
+          <p:blipFill>
+            <a:blip r:embed="rId6"/>
+            <a:stretch>
+              <a:fillRect/>
+            </a:stretch>
+          </p:blipFill>
+          <p:spPr>
+            <a:xfrm>
+              <a:off x="6410592" y="1689523"/>
+              <a:ext cx="5762625" cy="390525"/>
+            </a:xfrm>
+            <a:prstGeom prst="rect">
+              <a:avLst/>
+            </a:prstGeom>
+          </p:spPr>
+        </p:pic>
+        <p:pic>
+          <p:nvPicPr>
+            <p:cNvPr id="15" name="图片 14">
+              <a:extLst>
+                <a:ext uri="{FF2B5EF4-FFF2-40B4-BE49-F238E27FC236}">
+                  <a16:creationId xmlns:a16="http://schemas.microsoft.com/office/drawing/2014/main" id="{85E820AD-655A-4538-AF27-0624DC1E7952}"/>
+                </a:ext>
+              </a:extLst>
+            </p:cNvPr>
+            <p:cNvPicPr>
+              <a:picLocks noChangeAspect="1"/>
+            </p:cNvPicPr>
+            <p:nvPr/>
+          </p:nvPicPr>
+          <p:blipFill>
+            <a:blip r:embed="rId7"/>
+            <a:stretch>
+              <a:fillRect/>
+            </a:stretch>
+          </p:blipFill>
+          <p:spPr>
+            <a:xfrm>
+              <a:off x="7501204" y="2032557"/>
+              <a:ext cx="3581400" cy="390525"/>
+            </a:xfrm>
+            <a:prstGeom prst="rect">
+              <a:avLst/>
+            </a:prstGeom>
+          </p:spPr>
+        </p:pic>
+      </p:grpSp>
+      <p:sp>
+        <p:nvSpPr>
+          <p:cNvPr id="20" name="文本框 19">
+            <a:extLst>
+              <a:ext uri="{FF2B5EF4-FFF2-40B4-BE49-F238E27FC236}">
+                <a16:creationId xmlns:a16="http://schemas.microsoft.com/office/drawing/2014/main" id="{30FD57B7-C0BE-4000-ABED-EA71E43B1EDA}"/>
+              </a:ext>
+            </a:extLst>
+          </p:cNvPr>
+          <p:cNvSpPr txBox="1"/>
+          <p:nvPr/>
+        </p:nvSpPr>
+        <p:spPr>
+          <a:xfrm>
+            <a:off x="540275" y="506055"/>
+            <a:ext cx="6715125" cy="369332"/>
+          </a:xfrm>
+          <a:prstGeom prst="rect">
+            <a:avLst/>
+          </a:prstGeom>
+          <a:noFill/>
+        </p:spPr>
+        <p:txBody>
+          <a:bodyPr wrap="square" rtlCol="0">
+            <a:spAutoFit/>
+          </a:bodyPr>
+          <a:lstStyle/>
+          <a:p>
+            <a:r>
+              <a:rPr lang="en-US" altLang="zh-CN" dirty="0"/>
+              <a:t>Light weight CNN: Deeper but less computation</a:t>
+            </a:r>
+            <a:endParaRPr lang="zh-CN" altLang="en-US" dirty="0"/>
+          </a:p>
+        </p:txBody>
+      </p:sp>
+    </p:spTree>
+    <p:extLst>
+      <p:ext uri="{BB962C8B-B14F-4D97-AF65-F5344CB8AC3E}">
+        <p14:creationId xmlns:p14="http://schemas.microsoft.com/office/powerpoint/2010/main" val="1287441394"/>
+      </p:ext>
+    </p:extLst>
+  </p:cSld>
+  <p:clrMapOvr>
+    <a:masterClrMapping/>
+  </p:clrMapOvr>
+</p:sld>
+</file>
+
+<file path=ppt/slides/slide3.xml><?xml version="1.0" encoding="utf-8"?>
+<p:sld xmlns:a="http://schemas.openxmlformats.org/drawingml/2006/main" xmlns:r="http://schemas.openxmlformats.org/officeDocument/2006/relationships" xmlns:p="http://schemas.openxmlformats.org/presentationml/2006/main">
+  <p:cSld>
+    <p:spTree>
+      <p:nvGrpSpPr>
+        <p:cNvPr id="1" name=""/>
+        <p:cNvGrpSpPr/>
+        <p:nvPr/>
+      </p:nvGrpSpPr>
+      <p:grpSpPr>
+        <a:xfrm>
+          <a:off x="0" y="0"/>
+          <a:ext cx="0" cy="0"/>
+          <a:chOff x="0" y="0"/>
+          <a:chExt cx="0" cy="0"/>
+        </a:xfrm>
+      </p:grpSpPr>
+      <p:sp>
+        <p:nvSpPr>
+          <p:cNvPr id="4" name="文本框 3">
+            <a:extLst>
+              <a:ext uri="{FF2B5EF4-FFF2-40B4-BE49-F238E27FC236}">
+                <a16:creationId xmlns:a16="http://schemas.microsoft.com/office/drawing/2014/main" id="{9B42AC91-180B-41C9-AD6A-360B940FDF9A}"/>
+              </a:ext>
+            </a:extLst>
+          </p:cNvPr>
+          <p:cNvSpPr txBox="1"/>
+          <p:nvPr/>
+        </p:nvSpPr>
+        <p:spPr>
+          <a:xfrm>
+            <a:off x="441368" y="450388"/>
+            <a:ext cx="6715125" cy="369332"/>
+          </a:xfrm>
+          <a:prstGeom prst="rect">
+            <a:avLst/>
+          </a:prstGeom>
+          <a:noFill/>
+        </p:spPr>
+        <p:txBody>
+          <a:bodyPr wrap="square" rtlCol="0">
+            <a:spAutoFit/>
+          </a:bodyPr>
+          <a:lstStyle/>
+          <a:p>
+            <a:r>
+              <a:rPr lang="en-US" altLang="zh-CN" dirty="0"/>
+              <a:t>Light weight CNN: Deeper but less computation</a:t>
+            </a:r>
+            <a:endParaRPr lang="zh-CN" altLang="en-US" dirty="0"/>
+          </a:p>
+        </p:txBody>
+      </p:sp>
+      <p:pic>
+        <p:nvPicPr>
+          <p:cNvPr id="7" name="图片 6">
+            <a:extLst>
+              <a:ext uri="{FF2B5EF4-FFF2-40B4-BE49-F238E27FC236}">
+                <a16:creationId xmlns:a16="http://schemas.microsoft.com/office/drawing/2014/main" id="{B87AD8F0-73BB-482F-8BBC-EF42AD6F3606}"/>
+              </a:ext>
+            </a:extLst>
+          </p:cNvPr>
+          <p:cNvPicPr>
+            <a:picLocks noChangeAspect="1"/>
+          </p:cNvPicPr>
+          <p:nvPr/>
+        </p:nvPicPr>
+        <p:blipFill>
+          <a:blip r:embed="rId3"/>
+          <a:stretch>
+            <a:fillRect/>
+          </a:stretch>
+        </p:blipFill>
+        <p:spPr>
+          <a:xfrm>
+            <a:off x="950260" y="1175221"/>
+            <a:ext cx="3651832" cy="3911413"/>
+          </a:xfrm>
+          <a:prstGeom prst="rect">
+            <a:avLst/>
+          </a:prstGeom>
+        </p:spPr>
+      </p:pic>
+      <p:pic>
+        <p:nvPicPr>
+          <p:cNvPr id="4102" name="Picture 6" descr="https://pic3.zhimg.com/80/v2-7cdf75ec38bd4ed388a4f3bfd04a1df2_720w.webp">
+            <a:extLst>
+              <a:ext uri="{FF2B5EF4-FFF2-40B4-BE49-F238E27FC236}">
+                <a16:creationId xmlns:a16="http://schemas.microsoft.com/office/drawing/2014/main" id="{23C97842-3095-4B5D-97D2-C06CCDCFE03C}"/>
+              </a:ext>
+            </a:extLst>
+          </p:cNvPr>
+          <p:cNvPicPr>
+            <a:picLocks noChangeAspect="1" noChangeArrowheads="1"/>
+          </p:cNvPicPr>
+          <p:nvPr/>
+        </p:nvPicPr>
+        <p:blipFill>
+          <a:blip r:embed="rId4">
+            <a:extLst>
+              <a:ext uri="{28A0092B-C50C-407E-A947-70E740481C1C}">
+                <a14:useLocalDpi xmlns:a14="http://schemas.microsoft.com/office/drawing/2010/main" val="0"/>
+              </a:ext>
+            </a:extLst>
+          </a:blip>
+          <a:srcRect/>
+          <a:stretch>
+            <a:fillRect/>
+          </a:stretch>
+        </p:blipFill>
+        <p:spPr bwMode="auto">
+          <a:xfrm>
+            <a:off x="6343649" y="2348664"/>
+            <a:ext cx="5848351" cy="1385136"/>
+          </a:xfrm>
+          <a:prstGeom prst="rect">
+            <a:avLst/>
+          </a:prstGeom>
+          <a:noFill/>
+          <a:extLst>
+            <a:ext uri="{909E8E84-426E-40DD-AFC4-6F175D3DCCD1}">
+              <a14:hiddenFill xmlns:a14="http://schemas.microsoft.com/office/drawing/2010/main">
+                <a:solidFill>
+                  <a:srgbClr val="FFFFFF"/>
+                </a:solidFill>
+              </a14:hiddenFill>
+            </a:ext>
+          </a:extLst>
+        </p:spPr>
+      </p:pic>
+      <p:pic>
+        <p:nvPicPr>
+          <p:cNvPr id="3" name="图片 2">
+            <a:extLst>
+              <a:ext uri="{FF2B5EF4-FFF2-40B4-BE49-F238E27FC236}">
+                <a16:creationId xmlns:a16="http://schemas.microsoft.com/office/drawing/2014/main" id="{5B441513-0733-4B19-B203-242107379C5E}"/>
+              </a:ext>
+            </a:extLst>
+          </p:cNvPr>
+          <p:cNvPicPr>
+            <a:picLocks noChangeAspect="1"/>
+          </p:cNvPicPr>
+          <p:nvPr/>
+        </p:nvPicPr>
+        <p:blipFill>
+          <a:blip r:embed="rId5"/>
+          <a:stretch>
+            <a:fillRect/>
+          </a:stretch>
+        </p:blipFill>
+        <p:spPr>
+          <a:xfrm>
+            <a:off x="160122" y="5174687"/>
+            <a:ext cx="2816159" cy="1683313"/>
+          </a:xfrm>
+          <a:prstGeom prst="rect">
+            <a:avLst/>
+          </a:prstGeom>
+        </p:spPr>
+      </p:pic>
+      <p:sp>
+        <p:nvSpPr>
+          <p:cNvPr id="5" name="AutoShape 4" descr="https://pic4.zhimg.com/80/v2-60a70f311b302cc51d95b8d43d8c19bf_720w.webp">
+            <a:extLst>
+              <a:ext uri="{FF2B5EF4-FFF2-40B4-BE49-F238E27FC236}">
+                <a16:creationId xmlns:a16="http://schemas.microsoft.com/office/drawing/2014/main" id="{264467CD-ADA5-401F-A1FD-9AA95057E55F}"/>
+              </a:ext>
+            </a:extLst>
+          </p:cNvPr>
+          <p:cNvSpPr>
+            <a:spLocks noChangeAspect="1" noChangeArrowheads="1"/>
+          </p:cNvSpPr>
+          <p:nvPr/>
+        </p:nvSpPr>
+        <p:spPr bwMode="auto">
+          <a:xfrm>
+            <a:off x="5943600" y="3276600"/>
+            <a:ext cx="304800" cy="304800"/>
+          </a:xfrm>
+          <a:prstGeom prst="rect">
+            <a:avLst/>
+          </a:prstGeom>
+          <a:noFill/>
+          <a:extLst>
+            <a:ext uri="{909E8E84-426E-40DD-AFC4-6F175D3DCCD1}">
+              <a14:hiddenFill xmlns:a14="http://schemas.microsoft.com/office/drawing/2010/main">
+                <a:solidFill>
+                  <a:srgbClr val="FFFFFF"/>
+                </a:solidFill>
+              </a14:hiddenFill>
+            </a:ext>
+          </a:extLst>
+        </p:spPr>
+        <p:txBody>
+          <a:bodyPr vert="horz" wrap="square" lIns="91440" tIns="45720" rIns="91440" bIns="45720" numCol="1" anchor="t" anchorCtr="0" compatLnSpc="1">
+            <a:prstTxWarp prst="textNoShape">
+              <a:avLst/>
+            </a:prstTxWarp>
+          </a:bodyPr>
+          <a:lstStyle/>
+          <a:p>
+            <a:endParaRPr lang="zh-CN" altLang="en-US"/>
+          </a:p>
+        </p:txBody>
+      </p:sp>
+      <p:pic>
+        <p:nvPicPr>
+          <p:cNvPr id="8" name="图片 7">
+            <a:extLst>
+              <a:ext uri="{FF2B5EF4-FFF2-40B4-BE49-F238E27FC236}">
+                <a16:creationId xmlns:a16="http://schemas.microsoft.com/office/drawing/2014/main" id="{B11178E3-05F1-47D8-9A36-1A1B74A98F9E}"/>
+              </a:ext>
+            </a:extLst>
+          </p:cNvPr>
+          <p:cNvPicPr>
+            <a:picLocks noChangeAspect="1"/>
+          </p:cNvPicPr>
+          <p:nvPr/>
+        </p:nvPicPr>
+        <p:blipFill>
+          <a:blip r:embed="rId6"/>
+          <a:stretch>
+            <a:fillRect/>
+          </a:stretch>
+        </p:blipFill>
+        <p:spPr>
+          <a:xfrm>
+            <a:off x="6619150" y="565576"/>
+            <a:ext cx="4439472" cy="1517467"/>
+          </a:xfrm>
+          <a:prstGeom prst="rect">
+            <a:avLst/>
+          </a:prstGeom>
+        </p:spPr>
+      </p:pic>
+      <p:pic>
+        <p:nvPicPr>
+          <p:cNvPr id="9" name="图片 8">
+            <a:extLst>
+              <a:ext uri="{FF2B5EF4-FFF2-40B4-BE49-F238E27FC236}">
+                <a16:creationId xmlns:a16="http://schemas.microsoft.com/office/drawing/2014/main" id="{AC5C616C-CA67-4739-85FA-8F1BA2535155}"/>
+              </a:ext>
+            </a:extLst>
+          </p:cNvPr>
+          <p:cNvPicPr>
+            <a:picLocks noChangeAspect="1"/>
+          </p:cNvPicPr>
+          <p:nvPr/>
+        </p:nvPicPr>
+        <p:blipFill>
+          <a:blip r:embed="rId7"/>
+          <a:stretch>
+            <a:fillRect/>
+          </a:stretch>
+        </p:blipFill>
+        <p:spPr>
+          <a:xfrm>
+            <a:off x="2812035" y="5490952"/>
+            <a:ext cx="3922210" cy="1367048"/>
+          </a:xfrm>
+          <a:prstGeom prst="rect">
+            <a:avLst/>
+          </a:prstGeom>
+        </p:spPr>
+      </p:pic>
+      <p:pic>
+        <p:nvPicPr>
+          <p:cNvPr id="11" name="图片 10">
+            <a:extLst>
+              <a:ext uri="{FF2B5EF4-FFF2-40B4-BE49-F238E27FC236}">
+                <a16:creationId xmlns:a16="http://schemas.microsoft.com/office/drawing/2014/main" id="{A46FBE00-55D5-4A8C-B488-97E707890B17}"/>
+              </a:ext>
+            </a:extLst>
+          </p:cNvPr>
+          <p:cNvPicPr>
+            <a:picLocks noChangeAspect="1"/>
+          </p:cNvPicPr>
+          <p:nvPr/>
+        </p:nvPicPr>
+        <p:blipFill>
+          <a:blip r:embed="rId8"/>
+          <a:stretch>
+            <a:fillRect/>
+          </a:stretch>
+        </p:blipFill>
+        <p:spPr>
+          <a:xfrm>
+            <a:off x="6929815" y="4015067"/>
+            <a:ext cx="4423423" cy="2784662"/>
+          </a:xfrm>
+          <a:prstGeom prst="rect">
+            <a:avLst/>
+          </a:prstGeom>
+        </p:spPr>
+      </p:pic>
+    </p:spTree>
+    <p:extLst>
+      <p:ext uri="{BB962C8B-B14F-4D97-AF65-F5344CB8AC3E}">
+        <p14:creationId xmlns:p14="http://schemas.microsoft.com/office/powerpoint/2010/main" val="3152379390"/>
+      </p:ext>
+    </p:extLst>
+  </p:cSld>
+  <p:clrMapOvr>
+    <a:masterClrMapping/>
+  </p:clrMapOvr>
+</p:sld>
+</file>
+
+<file path=ppt/slides/slide4.xml><?xml version="1.0" encoding="utf-8"?>
+<p:sld xmlns:a="http://schemas.openxmlformats.org/drawingml/2006/main" xmlns:r="http://schemas.openxmlformats.org/officeDocument/2006/relationships" xmlns:p="http://schemas.openxmlformats.org/presentationml/2006/main">
+  <p:cSld>
+    <p:spTree>
+      <p:nvGrpSpPr>
+        <p:cNvPr id="1" name=""/>
+        <p:cNvGrpSpPr/>
+        <p:nvPr/>
+      </p:nvGrpSpPr>
+      <p:grpSpPr>
+        <a:xfrm>
+          <a:off x="0" y="0"/>
+          <a:ext cx="0" cy="0"/>
+          <a:chOff x="0" y="0"/>
+          <a:chExt cx="0" cy="0"/>
+        </a:xfrm>
+      </p:grpSpPr>
+      <p:pic>
+        <p:nvPicPr>
           <p:cNvPr id="5" name="图片 4">
             <a:extLst>
               <a:ext uri="{FF2B5EF4-FFF2-40B4-BE49-F238E27FC236}">
@@ -3816,8 +5487,232 @@
         </p:blipFill>
         <p:spPr>
           <a:xfrm>
-            <a:off x="6562308" y="1967498"/>
+            <a:off x="6552450" y="3218774"/>
             <a:ext cx="5404791" cy="3639226"/>
+          </a:xfrm>
+          <a:prstGeom prst="rect">
+            <a:avLst/>
+          </a:prstGeom>
+        </p:spPr>
+      </p:pic>
+      <p:pic>
+        <p:nvPicPr>
+          <p:cNvPr id="4" name="Picture 2" descr="在这里插入图片描述">
+            <a:extLst>
+              <a:ext uri="{FF2B5EF4-FFF2-40B4-BE49-F238E27FC236}">
+                <a16:creationId xmlns:a16="http://schemas.microsoft.com/office/drawing/2014/main" id="{F9D29552-BF8F-4CE5-A8C1-0B7C937A969D}"/>
+              </a:ext>
+            </a:extLst>
+          </p:cNvPr>
+          <p:cNvPicPr>
+            <a:picLocks noChangeAspect="1" noChangeArrowheads="1"/>
+          </p:cNvPicPr>
+          <p:nvPr/>
+        </p:nvPicPr>
+        <p:blipFill>
+          <a:blip r:embed="rId5">
+            <a:extLst>
+              <a:ext uri="{28A0092B-C50C-407E-A947-70E740481C1C}">
+                <a14:useLocalDpi xmlns:a14="http://schemas.microsoft.com/office/drawing/2010/main" val="0"/>
+              </a:ext>
+            </a:extLst>
+          </a:blip>
+          <a:srcRect/>
+          <a:stretch>
+            <a:fillRect/>
+          </a:stretch>
+        </p:blipFill>
+        <p:spPr bwMode="auto">
+          <a:xfrm>
+            <a:off x="6457200" y="85725"/>
+            <a:ext cx="5238750" cy="2888189"/>
+          </a:xfrm>
+          <a:prstGeom prst="rect">
+            <a:avLst/>
+          </a:prstGeom>
+          <a:noFill/>
+          <a:extLst>
+            <a:ext uri="{909E8E84-426E-40DD-AFC4-6F175D3DCCD1}">
+              <a14:hiddenFill xmlns:a14="http://schemas.microsoft.com/office/drawing/2010/main">
+                <a:solidFill>
+                  <a:srgbClr val="FFFFFF"/>
+                </a:solidFill>
+              </a14:hiddenFill>
+            </a:ext>
+          </a:extLst>
+        </p:spPr>
+      </p:pic>
+      <p:sp>
+        <p:nvSpPr>
+          <p:cNvPr id="2" name="文本框 1">
+            <a:extLst>
+              <a:ext uri="{FF2B5EF4-FFF2-40B4-BE49-F238E27FC236}">
+                <a16:creationId xmlns:a16="http://schemas.microsoft.com/office/drawing/2014/main" id="{9949A221-8C23-4B5A-8980-25C23CE360D7}"/>
+              </a:ext>
+            </a:extLst>
+          </p:cNvPr>
+          <p:cNvSpPr txBox="1"/>
+          <p:nvPr/>
+        </p:nvSpPr>
+        <p:spPr>
+          <a:xfrm>
+            <a:off x="352425" y="209550"/>
+            <a:ext cx="3267075" cy="369332"/>
+          </a:xfrm>
+          <a:prstGeom prst="rect">
+            <a:avLst/>
+          </a:prstGeom>
+          <a:noFill/>
+        </p:spPr>
+        <p:txBody>
+          <a:bodyPr wrap="square" rtlCol="0">
+            <a:spAutoFit/>
+          </a:bodyPr>
+          <a:lstStyle/>
+          <a:p>
+            <a:r>
+              <a:rPr lang="en-US" altLang="zh-CN" dirty="0"/>
+              <a:t>Dynamic Convolutional Kernel</a:t>
+            </a:r>
+            <a:endParaRPr lang="zh-CN" altLang="en-US" dirty="0"/>
+          </a:p>
+        </p:txBody>
+      </p:sp>
+    </p:spTree>
+    <p:extLst>
+      <p:ext uri="{BB962C8B-B14F-4D97-AF65-F5344CB8AC3E}">
+        <p14:creationId xmlns:p14="http://schemas.microsoft.com/office/powerpoint/2010/main" val="3611197264"/>
+      </p:ext>
+    </p:extLst>
+  </p:cSld>
+  <p:clrMapOvr>
+    <a:masterClrMapping/>
+  </p:clrMapOvr>
+</p:sld>
+</file>
+
+<file path=ppt/slides/slide5.xml><?xml version="1.0" encoding="utf-8"?>
+<p:sld xmlns:a="http://schemas.openxmlformats.org/drawingml/2006/main" xmlns:r="http://schemas.openxmlformats.org/officeDocument/2006/relationships" xmlns:p="http://schemas.openxmlformats.org/presentationml/2006/main">
+  <p:cSld>
+    <p:spTree>
+      <p:nvGrpSpPr>
+        <p:cNvPr id="1" name=""/>
+        <p:cNvGrpSpPr/>
+        <p:nvPr/>
+      </p:nvGrpSpPr>
+      <p:grpSpPr>
+        <a:xfrm>
+          <a:off x="0" y="0"/>
+          <a:ext cx="0" cy="0"/>
+          <a:chOff x="0" y="0"/>
+          <a:chExt cx="0" cy="0"/>
+        </a:xfrm>
+      </p:grpSpPr>
+      <p:grpSp>
+        <p:nvGrpSpPr>
+          <p:cNvPr id="7" name="组合 6">
+            <a:extLst>
+              <a:ext uri="{FF2B5EF4-FFF2-40B4-BE49-F238E27FC236}">
+                <a16:creationId xmlns:a16="http://schemas.microsoft.com/office/drawing/2014/main" id="{FD41F200-E11A-4FBF-A183-47C0036F7109}"/>
+              </a:ext>
+            </a:extLst>
+          </p:cNvPr>
+          <p:cNvGrpSpPr/>
+          <p:nvPr/>
+        </p:nvGrpSpPr>
+        <p:grpSpPr>
+          <a:xfrm>
+            <a:off x="97654" y="2512380"/>
+            <a:ext cx="5086905" cy="3391728"/>
+            <a:chOff x="216486" y="2109787"/>
+            <a:chExt cx="6651547" cy="4102316"/>
+          </a:xfrm>
+        </p:grpSpPr>
+        <p:pic>
+          <p:nvPicPr>
+            <p:cNvPr id="4" name="图片 3">
+              <a:extLst>
+                <a:ext uri="{FF2B5EF4-FFF2-40B4-BE49-F238E27FC236}">
+                  <a16:creationId xmlns:a16="http://schemas.microsoft.com/office/drawing/2014/main" id="{494EC723-AB1D-4A2C-A3B0-F21B5F3A6440}"/>
+                </a:ext>
+              </a:extLst>
+            </p:cNvPr>
+            <p:cNvPicPr>
+              <a:picLocks noChangeAspect="1"/>
+            </p:cNvPicPr>
+            <p:nvPr/>
+          </p:nvPicPr>
+          <p:blipFill>
+            <a:blip r:embed="rId2"/>
+            <a:stretch>
+              <a:fillRect/>
+            </a:stretch>
+          </p:blipFill>
+          <p:spPr>
+            <a:xfrm>
+              <a:off x="216486" y="2109787"/>
+              <a:ext cx="6343650" cy="2638425"/>
+            </a:xfrm>
+            <a:prstGeom prst="rect">
+              <a:avLst/>
+            </a:prstGeom>
+          </p:spPr>
+        </p:pic>
+        <p:pic>
+          <p:nvPicPr>
+            <p:cNvPr id="5" name="图片 4">
+              <a:extLst>
+                <a:ext uri="{FF2B5EF4-FFF2-40B4-BE49-F238E27FC236}">
+                  <a16:creationId xmlns:a16="http://schemas.microsoft.com/office/drawing/2014/main" id="{E257016A-53CB-4060-A05E-81E0C95C419F}"/>
+                </a:ext>
+              </a:extLst>
+            </p:cNvPr>
+            <p:cNvPicPr>
+              <a:picLocks noChangeAspect="1"/>
+            </p:cNvPicPr>
+            <p:nvPr/>
+          </p:nvPicPr>
+          <p:blipFill>
+            <a:blip r:embed="rId3"/>
+            <a:stretch>
+              <a:fillRect/>
+            </a:stretch>
+          </p:blipFill>
+          <p:spPr>
+            <a:xfrm>
+              <a:off x="476758" y="4907178"/>
+              <a:ext cx="6391275" cy="1304925"/>
+            </a:xfrm>
+            <a:prstGeom prst="rect">
+              <a:avLst/>
+            </a:prstGeom>
+          </p:spPr>
+        </p:pic>
+      </p:grpSp>
+      <p:pic>
+        <p:nvPicPr>
+          <p:cNvPr id="6" name="图片 5">
+            <a:extLst>
+              <a:ext uri="{FF2B5EF4-FFF2-40B4-BE49-F238E27FC236}">
+                <a16:creationId xmlns:a16="http://schemas.microsoft.com/office/drawing/2014/main" id="{28B3298A-4FF0-463F-92E3-50C2F6990668}"/>
+              </a:ext>
+            </a:extLst>
+          </p:cNvPr>
+          <p:cNvPicPr>
+            <a:picLocks noChangeAspect="1"/>
+          </p:cNvPicPr>
+          <p:nvPr/>
+        </p:nvPicPr>
+        <p:blipFill>
+          <a:blip r:embed="rId4"/>
+          <a:stretch>
+            <a:fillRect/>
+          </a:stretch>
+        </p:blipFill>
+        <p:spPr>
+          <a:xfrm>
+            <a:off x="5429250" y="1269273"/>
+            <a:ext cx="6762750" cy="4933950"/>
           </a:xfrm>
           <a:prstGeom prst="rect">
             <a:avLst/>
@@ -3827,7 +5722,538 @@
     </p:spTree>
     <p:extLst>
       <p:ext uri="{BB962C8B-B14F-4D97-AF65-F5344CB8AC3E}">
-        <p14:creationId xmlns:p14="http://schemas.microsoft.com/office/powerpoint/2010/main" val="3611197264"/>
+        <p14:creationId xmlns:p14="http://schemas.microsoft.com/office/powerpoint/2010/main" val="1813289168"/>
+      </p:ext>
+    </p:extLst>
+  </p:cSld>
+  <p:clrMapOvr>
+    <a:masterClrMapping/>
+  </p:clrMapOvr>
+</p:sld>
+</file>
+
+<file path=ppt/slides/slide6.xml><?xml version="1.0" encoding="utf-8"?>
+<p:sld xmlns:a="http://schemas.openxmlformats.org/drawingml/2006/main" xmlns:r="http://schemas.openxmlformats.org/officeDocument/2006/relationships" xmlns:p="http://schemas.openxmlformats.org/presentationml/2006/main">
+  <p:cSld>
+    <p:spTree>
+      <p:nvGrpSpPr>
+        <p:cNvPr id="1" name=""/>
+        <p:cNvGrpSpPr/>
+        <p:nvPr/>
+      </p:nvGrpSpPr>
+      <p:grpSpPr>
+        <a:xfrm>
+          <a:off x="0" y="0"/>
+          <a:ext cx="0" cy="0"/>
+          <a:chOff x="0" y="0"/>
+          <a:chExt cx="0" cy="0"/>
+        </a:xfrm>
+      </p:grpSpPr>
+      <p:pic>
+        <p:nvPicPr>
+          <p:cNvPr id="4" name="图片 3">
+            <a:extLst>
+              <a:ext uri="{FF2B5EF4-FFF2-40B4-BE49-F238E27FC236}">
+                <a16:creationId xmlns:a16="http://schemas.microsoft.com/office/drawing/2014/main" id="{FD8652DB-6768-4CA8-A0C5-876C2D765A52}"/>
+              </a:ext>
+            </a:extLst>
+          </p:cNvPr>
+          <p:cNvPicPr>
+            <a:picLocks noChangeAspect="1"/>
+          </p:cNvPicPr>
+          <p:nvPr/>
+        </p:nvPicPr>
+        <p:blipFill>
+          <a:blip r:embed="rId3"/>
+          <a:stretch>
+            <a:fillRect/>
+          </a:stretch>
+        </p:blipFill>
+        <p:spPr>
+          <a:xfrm>
+            <a:off x="294535" y="470516"/>
+            <a:ext cx="5400686" cy="2549926"/>
+          </a:xfrm>
+          <a:prstGeom prst="rect">
+            <a:avLst/>
+          </a:prstGeom>
+        </p:spPr>
+      </p:pic>
+      <p:pic>
+        <p:nvPicPr>
+          <p:cNvPr id="5" name="图片 4">
+            <a:extLst>
+              <a:ext uri="{FF2B5EF4-FFF2-40B4-BE49-F238E27FC236}">
+                <a16:creationId xmlns:a16="http://schemas.microsoft.com/office/drawing/2014/main" id="{26DD6D2A-EEA9-41C7-AE93-CAEDDC45D93F}"/>
+              </a:ext>
+            </a:extLst>
+          </p:cNvPr>
+          <p:cNvPicPr>
+            <a:picLocks noChangeAspect="1"/>
+          </p:cNvPicPr>
+          <p:nvPr/>
+        </p:nvPicPr>
+        <p:blipFill>
+          <a:blip r:embed="rId4"/>
+          <a:stretch>
+            <a:fillRect/>
+          </a:stretch>
+        </p:blipFill>
+        <p:spPr>
+          <a:xfrm>
+            <a:off x="6330262" y="111513"/>
+            <a:ext cx="4875229" cy="2953701"/>
+          </a:xfrm>
+          <a:prstGeom prst="rect">
+            <a:avLst/>
+          </a:prstGeom>
+        </p:spPr>
+      </p:pic>
+      <p:pic>
+        <p:nvPicPr>
+          <p:cNvPr id="6" name="图片 5">
+            <a:extLst>
+              <a:ext uri="{FF2B5EF4-FFF2-40B4-BE49-F238E27FC236}">
+                <a16:creationId xmlns:a16="http://schemas.microsoft.com/office/drawing/2014/main" id="{41B51372-532A-4200-9311-86D2A4D052A7}"/>
+              </a:ext>
+            </a:extLst>
+          </p:cNvPr>
+          <p:cNvPicPr>
+            <a:picLocks noChangeAspect="1"/>
+          </p:cNvPicPr>
+          <p:nvPr/>
+        </p:nvPicPr>
+        <p:blipFill>
+          <a:blip r:embed="rId5"/>
+          <a:stretch>
+            <a:fillRect/>
+          </a:stretch>
+        </p:blipFill>
+        <p:spPr>
+          <a:xfrm>
+            <a:off x="143615" y="3928008"/>
+            <a:ext cx="5103088" cy="2237718"/>
+          </a:xfrm>
+          <a:prstGeom prst="rect">
+            <a:avLst/>
+          </a:prstGeom>
+        </p:spPr>
+      </p:pic>
+      <p:grpSp>
+        <p:nvGrpSpPr>
+          <p:cNvPr id="9" name="组合 8">
+            <a:extLst>
+              <a:ext uri="{FF2B5EF4-FFF2-40B4-BE49-F238E27FC236}">
+                <a16:creationId xmlns:a16="http://schemas.microsoft.com/office/drawing/2014/main" id="{9062F046-106D-41AD-8CE6-1225D23492A6}"/>
+              </a:ext>
+            </a:extLst>
+          </p:cNvPr>
+          <p:cNvGrpSpPr/>
+          <p:nvPr/>
+        </p:nvGrpSpPr>
+        <p:grpSpPr>
+          <a:xfrm>
+            <a:off x="5695221" y="3429000"/>
+            <a:ext cx="6319225" cy="3399241"/>
+            <a:chOff x="5695221" y="3429000"/>
+            <a:chExt cx="6319225" cy="3399241"/>
+          </a:xfrm>
+        </p:grpSpPr>
+        <p:pic>
+          <p:nvPicPr>
+            <p:cNvPr id="7" name="图片 6">
+              <a:extLst>
+                <a:ext uri="{FF2B5EF4-FFF2-40B4-BE49-F238E27FC236}">
+                  <a16:creationId xmlns:a16="http://schemas.microsoft.com/office/drawing/2014/main" id="{154BB769-9AA6-4F35-83C1-AB92FBB42F21}"/>
+                </a:ext>
+              </a:extLst>
+            </p:cNvPr>
+            <p:cNvPicPr>
+              <a:picLocks noChangeAspect="1"/>
+            </p:cNvPicPr>
+            <p:nvPr/>
+          </p:nvPicPr>
+          <p:blipFill>
+            <a:blip r:embed="rId6"/>
+            <a:stretch>
+              <a:fillRect/>
+            </a:stretch>
+          </p:blipFill>
+          <p:spPr>
+            <a:xfrm>
+              <a:off x="5695221" y="3429000"/>
+              <a:ext cx="4875228" cy="3399241"/>
+            </a:xfrm>
+            <a:prstGeom prst="rect">
+              <a:avLst/>
+            </a:prstGeom>
+          </p:spPr>
+        </p:pic>
+        <p:pic>
+          <p:nvPicPr>
+            <p:cNvPr id="8" name="图片 7">
+              <a:extLst>
+                <a:ext uri="{FF2B5EF4-FFF2-40B4-BE49-F238E27FC236}">
+                  <a16:creationId xmlns:a16="http://schemas.microsoft.com/office/drawing/2014/main" id="{56FE6403-6222-4A24-9A22-71C22F09D4D8}"/>
+                </a:ext>
+              </a:extLst>
+            </p:cNvPr>
+            <p:cNvPicPr>
+              <a:picLocks noChangeAspect="1"/>
+            </p:cNvPicPr>
+            <p:nvPr/>
+          </p:nvPicPr>
+          <p:blipFill>
+            <a:blip r:embed="rId7"/>
+            <a:stretch>
+              <a:fillRect/>
+            </a:stretch>
+          </p:blipFill>
+          <p:spPr>
+            <a:xfrm>
+              <a:off x="10396536" y="4722693"/>
+              <a:ext cx="1617910" cy="612740"/>
+            </a:xfrm>
+            <a:prstGeom prst="rect">
+              <a:avLst/>
+            </a:prstGeom>
+          </p:spPr>
+        </p:pic>
+      </p:grpSp>
+    </p:spTree>
+    <p:extLst>
+      <p:ext uri="{BB962C8B-B14F-4D97-AF65-F5344CB8AC3E}">
+        <p14:creationId xmlns:p14="http://schemas.microsoft.com/office/powerpoint/2010/main" val="1431349211"/>
+      </p:ext>
+    </p:extLst>
+  </p:cSld>
+  <p:clrMapOvr>
+    <a:masterClrMapping/>
+  </p:clrMapOvr>
+</p:sld>
+</file>
+
+<file path=ppt/slides/slide7.xml><?xml version="1.0" encoding="utf-8"?>
+<p:sld xmlns:a="http://schemas.openxmlformats.org/drawingml/2006/main" xmlns:r="http://schemas.openxmlformats.org/officeDocument/2006/relationships" xmlns:p="http://schemas.openxmlformats.org/presentationml/2006/main">
+  <p:cSld>
+    <p:spTree>
+      <p:nvGrpSpPr>
+        <p:cNvPr id="1" name=""/>
+        <p:cNvGrpSpPr/>
+        <p:nvPr/>
+      </p:nvGrpSpPr>
+      <p:grpSpPr>
+        <a:xfrm>
+          <a:off x="0" y="0"/>
+          <a:ext cx="0" cy="0"/>
+          <a:chOff x="0" y="0"/>
+          <a:chExt cx="0" cy="0"/>
+        </a:xfrm>
+      </p:grpSpPr>
+      <p:pic>
+        <p:nvPicPr>
+          <p:cNvPr id="4" name="图片 3">
+            <a:extLst>
+              <a:ext uri="{FF2B5EF4-FFF2-40B4-BE49-F238E27FC236}">
+                <a16:creationId xmlns:a16="http://schemas.microsoft.com/office/drawing/2014/main" id="{3EA07094-E6F3-49E8-9CF1-CE2517824843}"/>
+              </a:ext>
+            </a:extLst>
+          </p:cNvPr>
+          <p:cNvPicPr>
+            <a:picLocks noChangeAspect="1"/>
+          </p:cNvPicPr>
+          <p:nvPr/>
+        </p:nvPicPr>
+        <p:blipFill>
+          <a:blip r:embed="rId2"/>
+          <a:stretch>
+            <a:fillRect/>
+          </a:stretch>
+        </p:blipFill>
+        <p:spPr>
+          <a:xfrm>
+            <a:off x="0" y="624946"/>
+            <a:ext cx="4043178" cy="2804054"/>
+          </a:xfrm>
+          <a:prstGeom prst="rect">
+            <a:avLst/>
+          </a:prstGeom>
+        </p:spPr>
+      </p:pic>
+      <p:pic>
+        <p:nvPicPr>
+          <p:cNvPr id="5" name="图片 4">
+            <a:extLst>
+              <a:ext uri="{FF2B5EF4-FFF2-40B4-BE49-F238E27FC236}">
+                <a16:creationId xmlns:a16="http://schemas.microsoft.com/office/drawing/2014/main" id="{7E08DA0E-C019-4FF6-B81C-604BDD210E2C}"/>
+              </a:ext>
+            </a:extLst>
+          </p:cNvPr>
+          <p:cNvPicPr>
+            <a:picLocks noChangeAspect="1"/>
+          </p:cNvPicPr>
+          <p:nvPr/>
+        </p:nvPicPr>
+        <p:blipFill>
+          <a:blip r:embed="rId3"/>
+          <a:stretch>
+            <a:fillRect/>
+          </a:stretch>
+        </p:blipFill>
+        <p:spPr>
+          <a:xfrm>
+            <a:off x="1793288" y="4197013"/>
+            <a:ext cx="7004482" cy="2466433"/>
+          </a:xfrm>
+          <a:prstGeom prst="rect">
+            <a:avLst/>
+          </a:prstGeom>
+        </p:spPr>
+      </p:pic>
+      <p:pic>
+        <p:nvPicPr>
+          <p:cNvPr id="6" name="图片 5">
+            <a:extLst>
+              <a:ext uri="{FF2B5EF4-FFF2-40B4-BE49-F238E27FC236}">
+                <a16:creationId xmlns:a16="http://schemas.microsoft.com/office/drawing/2014/main" id="{4ACA0A90-21EE-4F77-AC6D-3648E1CAA75E}"/>
+              </a:ext>
+            </a:extLst>
+          </p:cNvPr>
+          <p:cNvPicPr>
+            <a:picLocks noChangeAspect="1"/>
+          </p:cNvPicPr>
+          <p:nvPr/>
+        </p:nvPicPr>
+        <p:blipFill>
+          <a:blip r:embed="rId4"/>
+          <a:stretch>
+            <a:fillRect/>
+          </a:stretch>
+        </p:blipFill>
+        <p:spPr>
+          <a:xfrm>
+            <a:off x="3961662" y="405161"/>
+            <a:ext cx="4187162" cy="3572067"/>
+          </a:xfrm>
+          <a:prstGeom prst="rect">
+            <a:avLst/>
+          </a:prstGeom>
+        </p:spPr>
+      </p:pic>
+      <p:pic>
+        <p:nvPicPr>
+          <p:cNvPr id="7" name="图片 6">
+            <a:extLst>
+              <a:ext uri="{FF2B5EF4-FFF2-40B4-BE49-F238E27FC236}">
+                <a16:creationId xmlns:a16="http://schemas.microsoft.com/office/drawing/2014/main" id="{2F6C976C-CEC8-43E1-B1E2-FD6A2803C01F}"/>
+              </a:ext>
+            </a:extLst>
+          </p:cNvPr>
+          <p:cNvPicPr>
+            <a:picLocks noChangeAspect="1"/>
+          </p:cNvPicPr>
+          <p:nvPr/>
+        </p:nvPicPr>
+        <p:blipFill>
+          <a:blip r:embed="rId5"/>
+          <a:stretch>
+            <a:fillRect/>
+          </a:stretch>
+        </p:blipFill>
+        <p:spPr>
+          <a:xfrm>
+            <a:off x="8327116" y="843377"/>
+            <a:ext cx="3864884" cy="3029379"/>
+          </a:xfrm>
+          <a:prstGeom prst="rect">
+            <a:avLst/>
+          </a:prstGeom>
+        </p:spPr>
+      </p:pic>
+    </p:spTree>
+    <p:extLst>
+      <p:ext uri="{BB962C8B-B14F-4D97-AF65-F5344CB8AC3E}">
+        <p14:creationId xmlns:p14="http://schemas.microsoft.com/office/powerpoint/2010/main" val="373977148"/>
+      </p:ext>
+    </p:extLst>
+  </p:cSld>
+  <p:clrMapOvr>
+    <a:masterClrMapping/>
+  </p:clrMapOvr>
+</p:sld>
+</file>
+
+<file path=ppt/slides/slide8.xml><?xml version="1.0" encoding="utf-8"?>
+<p:sld xmlns:a="http://schemas.openxmlformats.org/drawingml/2006/main" xmlns:r="http://schemas.openxmlformats.org/officeDocument/2006/relationships" xmlns:p="http://schemas.openxmlformats.org/presentationml/2006/main">
+  <p:cSld>
+    <p:spTree>
+      <p:nvGrpSpPr>
+        <p:cNvPr id="1" name=""/>
+        <p:cNvGrpSpPr/>
+        <p:nvPr/>
+      </p:nvGrpSpPr>
+      <p:grpSpPr>
+        <a:xfrm>
+          <a:off x="0" y="0"/>
+          <a:ext cx="0" cy="0"/>
+          <a:chOff x="0" y="0"/>
+          <a:chExt cx="0" cy="0"/>
+        </a:xfrm>
+      </p:grpSpPr>
+      <p:pic>
+        <p:nvPicPr>
+          <p:cNvPr id="4" name="图片 3">
+            <a:extLst>
+              <a:ext uri="{FF2B5EF4-FFF2-40B4-BE49-F238E27FC236}">
+                <a16:creationId xmlns:a16="http://schemas.microsoft.com/office/drawing/2014/main" id="{56335DFF-40CA-47DF-AD3A-6D6A474E51F4}"/>
+              </a:ext>
+            </a:extLst>
+          </p:cNvPr>
+          <p:cNvPicPr>
+            <a:picLocks noChangeAspect="1"/>
+          </p:cNvPicPr>
+          <p:nvPr/>
+        </p:nvPicPr>
+        <p:blipFill>
+          <a:blip r:embed="rId2"/>
+          <a:stretch>
+            <a:fillRect/>
+          </a:stretch>
+        </p:blipFill>
+        <p:spPr>
+          <a:xfrm>
+            <a:off x="68054" y="762370"/>
+            <a:ext cx="4680854" cy="5333260"/>
+          </a:xfrm>
+          <a:prstGeom prst="rect">
+            <a:avLst/>
+          </a:prstGeom>
+        </p:spPr>
+      </p:pic>
+      <p:pic>
+        <p:nvPicPr>
+          <p:cNvPr id="5" name="图片 4">
+            <a:extLst>
+              <a:ext uri="{FF2B5EF4-FFF2-40B4-BE49-F238E27FC236}">
+                <a16:creationId xmlns:a16="http://schemas.microsoft.com/office/drawing/2014/main" id="{198A0862-F882-41B0-96DC-FD4E94FB2A3F}"/>
+              </a:ext>
+            </a:extLst>
+          </p:cNvPr>
+          <p:cNvPicPr>
+            <a:picLocks noChangeAspect="1"/>
+          </p:cNvPicPr>
+          <p:nvPr/>
+        </p:nvPicPr>
+        <p:blipFill>
+          <a:blip r:embed="rId3"/>
+          <a:stretch>
+            <a:fillRect/>
+          </a:stretch>
+        </p:blipFill>
+        <p:spPr>
+          <a:xfrm>
+            <a:off x="5619565" y="453384"/>
+            <a:ext cx="5279670" cy="6298084"/>
+          </a:xfrm>
+          <a:prstGeom prst="rect">
+            <a:avLst/>
+          </a:prstGeom>
+        </p:spPr>
+      </p:pic>
+    </p:spTree>
+    <p:extLst>
+      <p:ext uri="{BB962C8B-B14F-4D97-AF65-F5344CB8AC3E}">
+        <p14:creationId xmlns:p14="http://schemas.microsoft.com/office/powerpoint/2010/main" val="2559809836"/>
+      </p:ext>
+    </p:extLst>
+  </p:cSld>
+  <p:clrMapOvr>
+    <a:masterClrMapping/>
+  </p:clrMapOvr>
+</p:sld>
+</file>
+
+<file path=ppt/slides/slide9.xml><?xml version="1.0" encoding="utf-8"?>
+<p:sld xmlns:a="http://schemas.openxmlformats.org/drawingml/2006/main" xmlns:r="http://schemas.openxmlformats.org/officeDocument/2006/relationships" xmlns:p="http://schemas.openxmlformats.org/presentationml/2006/main">
+  <p:cSld>
+    <p:spTree>
+      <p:nvGrpSpPr>
+        <p:cNvPr id="1" name=""/>
+        <p:cNvGrpSpPr/>
+        <p:nvPr/>
+      </p:nvGrpSpPr>
+      <p:grpSpPr>
+        <a:xfrm>
+          <a:off x="0" y="0"/>
+          <a:ext cx="0" cy="0"/>
+          <a:chOff x="0" y="0"/>
+          <a:chExt cx="0" cy="0"/>
+        </a:xfrm>
+      </p:grpSpPr>
+      <p:pic>
+        <p:nvPicPr>
+          <p:cNvPr id="4" name="图片 3">
+            <a:extLst>
+              <a:ext uri="{FF2B5EF4-FFF2-40B4-BE49-F238E27FC236}">
+                <a16:creationId xmlns:a16="http://schemas.microsoft.com/office/drawing/2014/main" id="{336E4CFC-B055-44A0-A250-804B0B4DE933}"/>
+              </a:ext>
+            </a:extLst>
+          </p:cNvPr>
+          <p:cNvPicPr>
+            <a:picLocks noChangeAspect="1"/>
+          </p:cNvPicPr>
+          <p:nvPr/>
+        </p:nvPicPr>
+        <p:blipFill>
+          <a:blip r:embed="rId2"/>
+          <a:stretch>
+            <a:fillRect/>
+          </a:stretch>
+        </p:blipFill>
+        <p:spPr>
+          <a:xfrm>
+            <a:off x="1473184" y="158272"/>
+            <a:ext cx="9070781" cy="3881068"/>
+          </a:xfrm>
+          <a:prstGeom prst="rect">
+            <a:avLst/>
+          </a:prstGeom>
+        </p:spPr>
+      </p:pic>
+      <p:pic>
+        <p:nvPicPr>
+          <p:cNvPr id="5" name="图片 4">
+            <a:extLst>
+              <a:ext uri="{FF2B5EF4-FFF2-40B4-BE49-F238E27FC236}">
+                <a16:creationId xmlns:a16="http://schemas.microsoft.com/office/drawing/2014/main" id="{152E850C-306E-4D05-9541-551A920C7770}"/>
+              </a:ext>
+            </a:extLst>
+          </p:cNvPr>
+          <p:cNvPicPr>
+            <a:picLocks noChangeAspect="1"/>
+          </p:cNvPicPr>
+          <p:nvPr/>
+        </p:nvPicPr>
+        <p:blipFill>
+          <a:blip r:embed="rId3"/>
+          <a:stretch>
+            <a:fillRect/>
+          </a:stretch>
+        </p:blipFill>
+        <p:spPr>
+          <a:xfrm>
+            <a:off x="3519964" y="4027477"/>
+            <a:ext cx="4977219" cy="2830523"/>
+          </a:xfrm>
+          <a:prstGeom prst="rect">
+            <a:avLst/>
+          </a:prstGeom>
+        </p:spPr>
+      </p:pic>
+    </p:spTree>
+    <p:extLst>
+      <p:ext uri="{BB962C8B-B14F-4D97-AF65-F5344CB8AC3E}">
+        <p14:creationId xmlns:p14="http://schemas.microsoft.com/office/powerpoint/2010/main" val="1522352258"/>
       </p:ext>
     </p:extLst>
   </p:cSld>

</xml_diff>